<commit_message>
Changed a few things in the PP presentation
</commit_message>
<xml_diff>
--- a/ICHCCI.pptx
+++ b/ICHCCI.pptx
@@ -176,7 +176,7 @@
           <a:noFill/>
           <a:extLst>
             <a:ext uri="{909E8E84-426E-40dd-AFC4-6F175D3DCCD1}">
-              <a14:hiddenFill xmlns="" xmlns:a14="http://schemas.microsoft.com/office/drawing/2010/main">
+              <a14:hiddenFill xmlns:a14="http://schemas.microsoft.com/office/drawing/2010/main" xmlns="">
                 <a:solidFill>
                   <a:srgbClr val="FFFFFF"/>
                 </a:solidFill>
@@ -235,7 +235,7 @@
             </a:ln>
             <a:extLst>
               <a:ext uri="{91240B29-F687-4f45-9708-019B960494DF}">
-                <a14:hiddenLine xmlns="" xmlns:a14="http://schemas.microsoft.com/office/drawing/2010/main" w="9525">
+                <a14:hiddenLine xmlns:a14="http://schemas.microsoft.com/office/drawing/2010/main" xmlns="" w="9525">
                   <a:solidFill>
                     <a:srgbClr val="000000"/>
                   </a:solidFill>
@@ -325,7 +325,7 @@
             </a:ln>
             <a:extLst>
               <a:ext uri="{91240B29-F687-4f45-9708-019B960494DF}">
-                <a14:hiddenLine xmlns="" xmlns:a14="http://schemas.microsoft.com/office/drawing/2010/main" w="9525">
+                <a14:hiddenLine xmlns:a14="http://schemas.microsoft.com/office/drawing/2010/main" xmlns="" w="9525">
                   <a:solidFill>
                     <a:srgbClr val="000000"/>
                   </a:solidFill>
@@ -415,7 +415,7 @@
             </a:ln>
             <a:extLst>
               <a:ext uri="{91240B29-F687-4f45-9708-019B960494DF}">
-                <a14:hiddenLine xmlns="" xmlns:a14="http://schemas.microsoft.com/office/drawing/2010/main" w="9525">
+                <a14:hiddenLine xmlns:a14="http://schemas.microsoft.com/office/drawing/2010/main" xmlns="" w="9525">
                   <a:solidFill>
                     <a:srgbClr val="000000"/>
                   </a:solidFill>
@@ -449,7 +449,7 @@
             </a:ln>
             <a:extLst>
               <a:ext uri="{91240B29-F687-4f45-9708-019B960494DF}">
-                <a14:hiddenLine xmlns="" xmlns:a14="http://schemas.microsoft.com/office/drawing/2010/main" w="9525">
+                <a14:hiddenLine xmlns:a14="http://schemas.microsoft.com/office/drawing/2010/main" xmlns="" w="9525">
                   <a:solidFill>
                     <a:srgbClr val="000000"/>
                   </a:solidFill>
@@ -539,7 +539,7 @@
             </a:ln>
             <a:extLst>
               <a:ext uri="{91240B29-F687-4f45-9708-019B960494DF}">
-                <a14:hiddenLine xmlns="" xmlns:a14="http://schemas.microsoft.com/office/drawing/2010/main" w="9525">
+                <a14:hiddenLine xmlns:a14="http://schemas.microsoft.com/office/drawing/2010/main" xmlns="" w="9525">
                   <a:solidFill>
                     <a:srgbClr val="000000"/>
                   </a:solidFill>
@@ -601,7 +601,7 @@
             </a:ln>
             <a:extLst>
               <a:ext uri="{91240B29-F687-4f45-9708-019B960494DF}">
-                <a14:hiddenLine xmlns="" xmlns:a14="http://schemas.microsoft.com/office/drawing/2010/main" w="9525">
+                <a14:hiddenLine xmlns:a14="http://schemas.microsoft.com/office/drawing/2010/main" xmlns="" w="9525">
                   <a:solidFill>
                     <a:srgbClr val="000000"/>
                   </a:solidFill>
@@ -663,7 +663,7 @@
             </a:ln>
             <a:extLst>
               <a:ext uri="{91240B29-F687-4f45-9708-019B960494DF}">
-                <a14:hiddenLine xmlns="" xmlns:a14="http://schemas.microsoft.com/office/drawing/2010/main" w="9525">
+                <a14:hiddenLine xmlns:a14="http://schemas.microsoft.com/office/drawing/2010/main" xmlns="" w="9525">
                   <a:solidFill>
                     <a:srgbClr val="000000"/>
                   </a:solidFill>
@@ -753,7 +753,7 @@
             </a:ln>
             <a:extLst>
               <a:ext uri="{91240B29-F687-4f45-9708-019B960494DF}">
-                <a14:hiddenLine xmlns="" xmlns:a14="http://schemas.microsoft.com/office/drawing/2010/main" w="9525">
+                <a14:hiddenLine xmlns:a14="http://schemas.microsoft.com/office/drawing/2010/main" xmlns="" w="9525">
                   <a:solidFill>
                     <a:srgbClr val="000000"/>
                   </a:solidFill>
@@ -815,7 +815,7 @@
             </a:ln>
             <a:extLst>
               <a:ext uri="{91240B29-F687-4f45-9708-019B960494DF}">
-                <a14:hiddenLine xmlns="" xmlns:a14="http://schemas.microsoft.com/office/drawing/2010/main" w="9525">
+                <a14:hiddenLine xmlns:a14="http://schemas.microsoft.com/office/drawing/2010/main" xmlns="" w="9525">
                   <a:solidFill>
                     <a:srgbClr val="000000"/>
                   </a:solidFill>
@@ -877,7 +877,7 @@
             </a:ln>
             <a:extLst>
               <a:ext uri="{91240B29-F687-4f45-9708-019B960494DF}">
-                <a14:hiddenLine xmlns="" xmlns:a14="http://schemas.microsoft.com/office/drawing/2010/main" w="9525">
+                <a14:hiddenLine xmlns:a14="http://schemas.microsoft.com/office/drawing/2010/main" xmlns="" w="9525">
                   <a:solidFill>
                     <a:srgbClr val="000000"/>
                   </a:solidFill>
@@ -967,7 +967,7 @@
             </a:ln>
             <a:extLst>
               <a:ext uri="{91240B29-F687-4f45-9708-019B960494DF}">
-                <a14:hiddenLine xmlns="" xmlns:a14="http://schemas.microsoft.com/office/drawing/2010/main" w="9525">
+                <a14:hiddenLine xmlns:a14="http://schemas.microsoft.com/office/drawing/2010/main" xmlns="" w="9525">
                   <a:solidFill>
                     <a:srgbClr val="000000"/>
                   </a:solidFill>
@@ -1057,7 +1057,7 @@
             </a:ln>
             <a:extLst>
               <a:ext uri="{91240B29-F687-4f45-9708-019B960494DF}">
-                <a14:hiddenLine xmlns="" xmlns:a14="http://schemas.microsoft.com/office/drawing/2010/main" w="9525">
+                <a14:hiddenLine xmlns:a14="http://schemas.microsoft.com/office/drawing/2010/main" xmlns="" w="9525">
                   <a:solidFill>
                     <a:srgbClr val="000000"/>
                   </a:solidFill>
@@ -1119,7 +1119,7 @@
             </a:ln>
             <a:extLst>
               <a:ext uri="{91240B29-F687-4f45-9708-019B960494DF}">
-                <a14:hiddenLine xmlns="" xmlns:a14="http://schemas.microsoft.com/office/drawing/2010/main" w="9525">
+                <a14:hiddenLine xmlns:a14="http://schemas.microsoft.com/office/drawing/2010/main" xmlns="" w="9525">
                   <a:solidFill>
                     <a:srgbClr val="000000"/>
                   </a:solidFill>
@@ -1229,7 +1229,7 @@
             </a:ln>
             <a:extLst>
               <a:ext uri="{91240B29-F687-4f45-9708-019B960494DF}">
-                <a14:hiddenLine xmlns="" xmlns:a14="http://schemas.microsoft.com/office/drawing/2010/main" w="9525">
+                <a14:hiddenLine xmlns:a14="http://schemas.microsoft.com/office/drawing/2010/main" xmlns="" w="9525">
                   <a:solidFill>
                     <a:srgbClr val="000000"/>
                   </a:solidFill>
@@ -1291,7 +1291,7 @@
             </a:ln>
             <a:extLst>
               <a:ext uri="{91240B29-F687-4f45-9708-019B960494DF}">
-                <a14:hiddenLine xmlns="" xmlns:a14="http://schemas.microsoft.com/office/drawing/2010/main" w="9525">
+                <a14:hiddenLine xmlns:a14="http://schemas.microsoft.com/office/drawing/2010/main" xmlns="" w="9525">
                   <a:solidFill>
                     <a:srgbClr val="000000"/>
                   </a:solidFill>
@@ -1381,7 +1381,7 @@
             </a:ln>
             <a:extLst>
               <a:ext uri="{91240B29-F687-4f45-9708-019B960494DF}">
-                <a14:hiddenLine xmlns="" xmlns:a14="http://schemas.microsoft.com/office/drawing/2010/main" w="9525">
+                <a14:hiddenLine xmlns:a14="http://schemas.microsoft.com/office/drawing/2010/main" xmlns="" w="9525">
                   <a:solidFill>
                     <a:srgbClr val="000000"/>
                   </a:solidFill>
@@ -1471,7 +1471,7 @@
             </a:ln>
             <a:extLst>
               <a:ext uri="{91240B29-F687-4f45-9708-019B960494DF}">
-                <a14:hiddenLine xmlns="" xmlns:a14="http://schemas.microsoft.com/office/drawing/2010/main" w="9525">
+                <a14:hiddenLine xmlns:a14="http://schemas.microsoft.com/office/drawing/2010/main" xmlns="" w="9525">
                   <a:solidFill>
                     <a:srgbClr val="000000"/>
                   </a:solidFill>
@@ -1533,7 +1533,7 @@
             </a:ln>
             <a:extLst>
               <a:ext uri="{91240B29-F687-4f45-9708-019B960494DF}">
-                <a14:hiddenLine xmlns="" xmlns:a14="http://schemas.microsoft.com/office/drawing/2010/main" w="9525">
+                <a14:hiddenLine xmlns:a14="http://schemas.microsoft.com/office/drawing/2010/main" xmlns="" w="9525">
                   <a:solidFill>
                     <a:srgbClr val="000000"/>
                   </a:solidFill>
@@ -1623,7 +1623,7 @@
             </a:ln>
             <a:extLst>
               <a:ext uri="{91240B29-F687-4f45-9708-019B960494DF}">
-                <a14:hiddenLine xmlns="" xmlns:a14="http://schemas.microsoft.com/office/drawing/2010/main" w="9525">
+                <a14:hiddenLine xmlns:a14="http://schemas.microsoft.com/office/drawing/2010/main" xmlns="" w="9525">
                   <a:solidFill>
                     <a:srgbClr val="000000"/>
                   </a:solidFill>
@@ -1713,7 +1713,7 @@
             </a:ln>
             <a:extLst>
               <a:ext uri="{91240B29-F687-4f45-9708-019B960494DF}">
-                <a14:hiddenLine xmlns="" xmlns:a14="http://schemas.microsoft.com/office/drawing/2010/main" w="9525">
+                <a14:hiddenLine xmlns:a14="http://schemas.microsoft.com/office/drawing/2010/main" xmlns="" w="9525">
                   <a:solidFill>
                     <a:srgbClr val="000000"/>
                   </a:solidFill>
@@ -1769,7 +1769,7 @@
             </a:ln>
             <a:extLst>
               <a:ext uri="{91240B29-F687-4f45-9708-019B960494DF}">
-                <a14:hiddenLine xmlns="" xmlns:a14="http://schemas.microsoft.com/office/drawing/2010/main" w="9525">
+                <a14:hiddenLine xmlns:a14="http://schemas.microsoft.com/office/drawing/2010/main" xmlns="" w="9525">
                   <a:solidFill>
                     <a:srgbClr val="000000"/>
                   </a:solidFill>
@@ -1859,7 +1859,7 @@
             </a:ln>
             <a:extLst>
               <a:ext uri="{91240B29-F687-4f45-9708-019B960494DF}">
-                <a14:hiddenLine xmlns="" xmlns:a14="http://schemas.microsoft.com/office/drawing/2010/main" w="9525">
+                <a14:hiddenLine xmlns:a14="http://schemas.microsoft.com/office/drawing/2010/main" xmlns="" w="9525">
                   <a:solidFill>
                     <a:srgbClr val="000000"/>
                   </a:solidFill>
@@ -1915,7 +1915,7 @@
             </a:ln>
             <a:extLst>
               <a:ext uri="{91240B29-F687-4f45-9708-019B960494DF}">
-                <a14:hiddenLine xmlns="" xmlns:a14="http://schemas.microsoft.com/office/drawing/2010/main" w="9525">
+                <a14:hiddenLine xmlns:a14="http://schemas.microsoft.com/office/drawing/2010/main" xmlns="" w="9525">
                   <a:solidFill>
                     <a:srgbClr val="000000"/>
                   </a:solidFill>
@@ -2005,7 +2005,7 @@
             </a:ln>
             <a:extLst>
               <a:ext uri="{91240B29-F687-4f45-9708-019B960494DF}">
-                <a14:hiddenLine xmlns="" xmlns:a14="http://schemas.microsoft.com/office/drawing/2010/main" w="9525">
+                <a14:hiddenLine xmlns:a14="http://schemas.microsoft.com/office/drawing/2010/main" xmlns="" w="9525">
                   <a:solidFill>
                     <a:srgbClr val="000000"/>
                   </a:solidFill>
@@ -2073,7 +2073,7 @@
             </a:ln>
             <a:extLst>
               <a:ext uri="{91240B29-F687-4f45-9708-019B960494DF}">
-                <a14:hiddenLine xmlns="" xmlns:a14="http://schemas.microsoft.com/office/drawing/2010/main" w="9525">
+                <a14:hiddenLine xmlns:a14="http://schemas.microsoft.com/office/drawing/2010/main" xmlns="" w="9525">
                   <a:solidFill>
                     <a:srgbClr val="000000"/>
                   </a:solidFill>
@@ -2163,7 +2163,7 @@
             </a:ln>
             <a:extLst>
               <a:ext uri="{91240B29-F687-4f45-9708-019B960494DF}">
-                <a14:hiddenLine xmlns="" xmlns:a14="http://schemas.microsoft.com/office/drawing/2010/main" w="9525">
+                <a14:hiddenLine xmlns:a14="http://schemas.microsoft.com/office/drawing/2010/main" xmlns="" w="9525">
                   <a:solidFill>
                     <a:srgbClr val="000000"/>
                   </a:solidFill>
@@ -2231,7 +2231,7 @@
             </a:ln>
             <a:extLst>
               <a:ext uri="{91240B29-F687-4f45-9708-019B960494DF}">
-                <a14:hiddenLine xmlns="" xmlns:a14="http://schemas.microsoft.com/office/drawing/2010/main" w="9525">
+                <a14:hiddenLine xmlns:a14="http://schemas.microsoft.com/office/drawing/2010/main" xmlns="" w="9525">
                   <a:solidFill>
                     <a:srgbClr val="000000"/>
                   </a:solidFill>
@@ -2321,7 +2321,7 @@
             </a:ln>
             <a:extLst>
               <a:ext uri="{91240B29-F687-4f45-9708-019B960494DF}">
-                <a14:hiddenLine xmlns="" xmlns:a14="http://schemas.microsoft.com/office/drawing/2010/main" w="9525">
+                <a14:hiddenLine xmlns:a14="http://schemas.microsoft.com/office/drawing/2010/main" xmlns="" w="9525">
                   <a:solidFill>
                     <a:srgbClr val="000000"/>
                   </a:solidFill>
@@ -2355,7 +2355,7 @@
             </a:ln>
             <a:extLst>
               <a:ext uri="{91240B29-F687-4f45-9708-019B960494DF}">
-                <a14:hiddenLine xmlns="" xmlns:a14="http://schemas.microsoft.com/office/drawing/2010/main" w="9525">
+                <a14:hiddenLine xmlns:a14="http://schemas.microsoft.com/office/drawing/2010/main" xmlns="" w="9525">
                   <a:solidFill>
                     <a:srgbClr val="000000"/>
                   </a:solidFill>
@@ -2445,7 +2445,7 @@
             </a:ln>
             <a:extLst>
               <a:ext uri="{91240B29-F687-4f45-9708-019B960494DF}">
-                <a14:hiddenLine xmlns="" xmlns:a14="http://schemas.microsoft.com/office/drawing/2010/main" w="9525">
+                <a14:hiddenLine xmlns:a14="http://schemas.microsoft.com/office/drawing/2010/main" xmlns="" w="9525">
                   <a:solidFill>
                     <a:srgbClr val="000000"/>
                   </a:solidFill>
@@ -2507,7 +2507,7 @@
             </a:ln>
             <a:extLst>
               <a:ext uri="{91240B29-F687-4f45-9708-019B960494DF}">
-                <a14:hiddenLine xmlns="" xmlns:a14="http://schemas.microsoft.com/office/drawing/2010/main" w="9525">
+                <a14:hiddenLine xmlns:a14="http://schemas.microsoft.com/office/drawing/2010/main" xmlns="" w="9525">
                   <a:solidFill>
                     <a:srgbClr val="000000"/>
                   </a:solidFill>
@@ -2569,7 +2569,7 @@
             </a:ln>
             <a:extLst>
               <a:ext uri="{91240B29-F687-4f45-9708-019B960494DF}">
-                <a14:hiddenLine xmlns="" xmlns:a14="http://schemas.microsoft.com/office/drawing/2010/main" w="9525">
+                <a14:hiddenLine xmlns:a14="http://schemas.microsoft.com/office/drawing/2010/main" xmlns="" w="9525">
                   <a:solidFill>
                     <a:srgbClr val="000000"/>
                   </a:solidFill>
@@ -2659,7 +2659,7 @@
             </a:ln>
             <a:extLst>
               <a:ext uri="{91240B29-F687-4f45-9708-019B960494DF}">
-                <a14:hiddenLine xmlns="" xmlns:a14="http://schemas.microsoft.com/office/drawing/2010/main" w="9525">
+                <a14:hiddenLine xmlns:a14="http://schemas.microsoft.com/office/drawing/2010/main" xmlns="" w="9525">
                   <a:solidFill>
                     <a:srgbClr val="000000"/>
                   </a:solidFill>
@@ -2727,7 +2727,7 @@
             </a:ln>
             <a:extLst>
               <a:ext uri="{91240B29-F687-4f45-9708-019B960494DF}">
-                <a14:hiddenLine xmlns="" xmlns:a14="http://schemas.microsoft.com/office/drawing/2010/main" w="9525">
+                <a14:hiddenLine xmlns:a14="http://schemas.microsoft.com/office/drawing/2010/main" xmlns="" w="9525">
                   <a:solidFill>
                     <a:srgbClr val="000000"/>
                   </a:solidFill>
@@ -2789,7 +2789,7 @@
             </a:ln>
             <a:extLst>
               <a:ext uri="{91240B29-F687-4f45-9708-019B960494DF}">
-                <a14:hiddenLine xmlns="" xmlns:a14="http://schemas.microsoft.com/office/drawing/2010/main" w="9525">
+                <a14:hiddenLine xmlns:a14="http://schemas.microsoft.com/office/drawing/2010/main" xmlns="" w="9525">
                   <a:solidFill>
                     <a:srgbClr val="000000"/>
                   </a:solidFill>
@@ -2879,7 +2879,7 @@
             </a:ln>
             <a:extLst>
               <a:ext uri="{91240B29-F687-4f45-9708-019B960494DF}">
-                <a14:hiddenLine xmlns="" xmlns:a14="http://schemas.microsoft.com/office/drawing/2010/main" w="9525">
+                <a14:hiddenLine xmlns:a14="http://schemas.microsoft.com/office/drawing/2010/main" xmlns="" w="9525">
                   <a:solidFill>
                     <a:srgbClr val="000000"/>
                   </a:solidFill>
@@ -2941,7 +2941,7 @@
             </a:ln>
             <a:extLst>
               <a:ext uri="{91240B29-F687-4f45-9708-019B960494DF}">
-                <a14:hiddenLine xmlns="" xmlns:a14="http://schemas.microsoft.com/office/drawing/2010/main" w="9525">
+                <a14:hiddenLine xmlns:a14="http://schemas.microsoft.com/office/drawing/2010/main" xmlns="" w="9525">
                   <a:solidFill>
                     <a:srgbClr val="000000"/>
                   </a:solidFill>
@@ -3031,7 +3031,7 @@
             </a:ln>
             <a:extLst>
               <a:ext uri="{91240B29-F687-4f45-9708-019B960494DF}">
-                <a14:hiddenLine xmlns="" xmlns:a14="http://schemas.microsoft.com/office/drawing/2010/main" w="9525">
+                <a14:hiddenLine xmlns:a14="http://schemas.microsoft.com/office/drawing/2010/main" xmlns="" w="9525">
                   <a:solidFill>
                     <a:srgbClr val="000000"/>
                   </a:solidFill>
@@ -3093,7 +3093,7 @@
             </a:ln>
             <a:extLst>
               <a:ext uri="{91240B29-F687-4f45-9708-019B960494DF}">
-                <a14:hiddenLine xmlns="" xmlns:a14="http://schemas.microsoft.com/office/drawing/2010/main" w="9525">
+                <a14:hiddenLine xmlns:a14="http://schemas.microsoft.com/office/drawing/2010/main" xmlns="" w="9525">
                   <a:solidFill>
                     <a:srgbClr val="000000"/>
                   </a:solidFill>
@@ -3183,7 +3183,7 @@
             </a:ln>
             <a:extLst>
               <a:ext uri="{91240B29-F687-4f45-9708-019B960494DF}">
-                <a14:hiddenLine xmlns="" xmlns:a14="http://schemas.microsoft.com/office/drawing/2010/main" w="9525">
+                <a14:hiddenLine xmlns:a14="http://schemas.microsoft.com/office/drawing/2010/main" xmlns="" w="9525">
                   <a:solidFill>
                     <a:srgbClr val="000000"/>
                   </a:solidFill>
@@ -3217,7 +3217,7 @@
             </a:ln>
             <a:extLst>
               <a:ext uri="{91240B29-F687-4f45-9708-019B960494DF}">
-                <a14:hiddenLine xmlns="" xmlns:a14="http://schemas.microsoft.com/office/drawing/2010/main" w="9525">
+                <a14:hiddenLine xmlns:a14="http://schemas.microsoft.com/office/drawing/2010/main" xmlns="" w="9525">
                   <a:solidFill>
                     <a:srgbClr val="000000"/>
                   </a:solidFill>
@@ -3282,7 +3282,7 @@
             </a:ln>
             <a:extLst>
               <a:ext uri="{91240B29-F687-4f45-9708-019B960494DF}">
-                <a14:hiddenLine xmlns="" xmlns:a14="http://schemas.microsoft.com/office/drawing/2010/main" w="9525">
+                <a14:hiddenLine xmlns:a14="http://schemas.microsoft.com/office/drawing/2010/main" xmlns="" w="9525">
                   <a:solidFill>
                     <a:srgbClr val="000000"/>
                   </a:solidFill>
@@ -3372,7 +3372,7 @@
             </a:ln>
             <a:extLst>
               <a:ext uri="{91240B29-F687-4f45-9708-019B960494DF}">
-                <a14:hiddenLine xmlns="" xmlns:a14="http://schemas.microsoft.com/office/drawing/2010/main" w="9525">
+                <a14:hiddenLine xmlns:a14="http://schemas.microsoft.com/office/drawing/2010/main" xmlns="" w="9525">
                   <a:solidFill>
                     <a:srgbClr val="000000"/>
                   </a:solidFill>
@@ -3434,7 +3434,7 @@
             </a:ln>
             <a:extLst>
               <a:ext uri="{91240B29-F687-4f45-9708-019B960494DF}">
-                <a14:hiddenLine xmlns="" xmlns:a14="http://schemas.microsoft.com/office/drawing/2010/main" w="9525">
+                <a14:hiddenLine xmlns:a14="http://schemas.microsoft.com/office/drawing/2010/main" xmlns="" w="9525">
                   <a:solidFill>
                     <a:srgbClr val="000000"/>
                   </a:solidFill>
@@ -3524,7 +3524,7 @@
             </a:ln>
             <a:extLst>
               <a:ext uri="{91240B29-F687-4f45-9708-019B960494DF}">
-                <a14:hiddenLine xmlns="" xmlns:a14="http://schemas.microsoft.com/office/drawing/2010/main" w="9525">
+                <a14:hiddenLine xmlns:a14="http://schemas.microsoft.com/office/drawing/2010/main" xmlns="" w="9525">
                   <a:solidFill>
                     <a:srgbClr val="000000"/>
                   </a:solidFill>
@@ -3614,7 +3614,7 @@
             </a:ln>
             <a:extLst>
               <a:ext uri="{91240B29-F687-4f45-9708-019B960494DF}">
-                <a14:hiddenLine xmlns="" xmlns:a14="http://schemas.microsoft.com/office/drawing/2010/main" w="9525">
+                <a14:hiddenLine xmlns:a14="http://schemas.microsoft.com/office/drawing/2010/main" xmlns="" w="9525">
                   <a:solidFill>
                     <a:srgbClr val="000000"/>
                   </a:solidFill>
@@ -3679,7 +3679,7 @@
             </a:ln>
             <a:extLst>
               <a:ext uri="{91240B29-F687-4f45-9708-019B960494DF}">
-                <a14:hiddenLine xmlns="" xmlns:a14="http://schemas.microsoft.com/office/drawing/2010/main" w="9525">
+                <a14:hiddenLine xmlns:a14="http://schemas.microsoft.com/office/drawing/2010/main" xmlns="" w="9525">
                   <a:solidFill>
                     <a:srgbClr val="000000"/>
                   </a:solidFill>
@@ -3741,7 +3741,7 @@
             </a:ln>
             <a:extLst>
               <a:ext uri="{91240B29-F687-4f45-9708-019B960494DF}">
-                <a14:hiddenLine xmlns="" xmlns:a14="http://schemas.microsoft.com/office/drawing/2010/main" w="9525">
+                <a14:hiddenLine xmlns:a14="http://schemas.microsoft.com/office/drawing/2010/main" xmlns="" w="9525">
                   <a:solidFill>
                     <a:srgbClr val="000000"/>
                   </a:solidFill>
@@ -3831,7 +3831,7 @@
             </a:ln>
             <a:extLst>
               <a:ext uri="{91240B29-F687-4f45-9708-019B960494DF}">
-                <a14:hiddenLine xmlns="" xmlns:a14="http://schemas.microsoft.com/office/drawing/2010/main" w="9525">
+                <a14:hiddenLine xmlns:a14="http://schemas.microsoft.com/office/drawing/2010/main" xmlns="" w="9525">
                   <a:solidFill>
                     <a:srgbClr val="000000"/>
                   </a:solidFill>
@@ -3921,7 +3921,7 @@
             </a:ln>
             <a:extLst>
               <a:ext uri="{91240B29-F687-4f45-9708-019B960494DF}">
-                <a14:hiddenLine xmlns="" xmlns:a14="http://schemas.microsoft.com/office/drawing/2010/main" w="9525">
+                <a14:hiddenLine xmlns:a14="http://schemas.microsoft.com/office/drawing/2010/main" xmlns="" w="9525">
                   <a:solidFill>
                     <a:srgbClr val="000000"/>
                   </a:solidFill>
@@ -3983,7 +3983,7 @@
             </a:ln>
             <a:extLst>
               <a:ext uri="{91240B29-F687-4f45-9708-019B960494DF}">
-                <a14:hiddenLine xmlns="" xmlns:a14="http://schemas.microsoft.com/office/drawing/2010/main" w="9525">
+                <a14:hiddenLine xmlns:a14="http://schemas.microsoft.com/office/drawing/2010/main" xmlns="" w="9525">
                   <a:solidFill>
                     <a:srgbClr val="000000"/>
                   </a:solidFill>
@@ -4103,7 +4103,7 @@
             </a:ln>
             <a:extLst>
               <a:ext uri="{91240B29-F687-4f45-9708-019B960494DF}">
-                <a14:hiddenLine xmlns="" xmlns:a14="http://schemas.microsoft.com/office/drawing/2010/main" w="9525">
+                <a14:hiddenLine xmlns:a14="http://schemas.microsoft.com/office/drawing/2010/main" xmlns="" w="9525">
                   <a:solidFill>
                     <a:srgbClr val="000000"/>
                   </a:solidFill>
@@ -4171,7 +4171,7 @@
             </a:ln>
             <a:extLst>
               <a:ext uri="{91240B29-F687-4f45-9708-019B960494DF}">
-                <a14:hiddenLine xmlns="" xmlns:a14="http://schemas.microsoft.com/office/drawing/2010/main" w="9525">
+                <a14:hiddenLine xmlns:a14="http://schemas.microsoft.com/office/drawing/2010/main" xmlns="" w="9525">
                   <a:solidFill>
                     <a:srgbClr val="000000"/>
                   </a:solidFill>
@@ -4261,7 +4261,7 @@
             </a:ln>
             <a:extLst>
               <a:ext uri="{91240B29-F687-4f45-9708-019B960494DF}">
-                <a14:hiddenLine xmlns="" xmlns:a14="http://schemas.microsoft.com/office/drawing/2010/main" w="9525">
+                <a14:hiddenLine xmlns:a14="http://schemas.microsoft.com/office/drawing/2010/main" xmlns="" w="9525">
                   <a:solidFill>
                     <a:srgbClr val="000000"/>
                   </a:solidFill>
@@ -9075,7 +9075,7 @@
           <a:noFill/>
           <a:extLst>
             <a:ext uri="{909E8E84-426E-40dd-AFC4-6F175D3DCCD1}">
-              <a14:hiddenFill xmlns="" xmlns:a14="http://schemas.microsoft.com/office/drawing/2010/main">
+              <a14:hiddenFill xmlns:a14="http://schemas.microsoft.com/office/drawing/2010/main" xmlns="">
                 <a:solidFill>
                   <a:srgbClr val="FFFFFF"/>
                 </a:solidFill>
@@ -9149,7 +9149,7 @@
               </a:ln>
               <a:extLst>
                 <a:ext uri="{91240B29-F687-4f45-9708-019B960494DF}">
-                  <a14:hiddenLine xmlns="" xmlns:a14="http://schemas.microsoft.com/office/drawing/2010/main" w="9525">
+                  <a14:hiddenLine xmlns:a14="http://schemas.microsoft.com/office/drawing/2010/main" xmlns="" w="9525">
                     <a:solidFill>
                       <a:srgbClr val="000000"/>
                     </a:solidFill>
@@ -9239,7 +9239,7 @@
               </a:ln>
               <a:extLst>
                 <a:ext uri="{91240B29-F687-4f45-9708-019B960494DF}">
-                  <a14:hiddenLine xmlns="" xmlns:a14="http://schemas.microsoft.com/office/drawing/2010/main" w="9525">
+                  <a14:hiddenLine xmlns:a14="http://schemas.microsoft.com/office/drawing/2010/main" xmlns="" w="9525">
                     <a:solidFill>
                       <a:srgbClr val="000000"/>
                     </a:solidFill>
@@ -9329,7 +9329,7 @@
               </a:ln>
               <a:extLst>
                 <a:ext uri="{91240B29-F687-4f45-9708-019B960494DF}">
-                  <a14:hiddenLine xmlns="" xmlns:a14="http://schemas.microsoft.com/office/drawing/2010/main" w="9525">
+                  <a14:hiddenLine xmlns:a14="http://schemas.microsoft.com/office/drawing/2010/main" xmlns="" w="9525">
                     <a:solidFill>
                       <a:srgbClr val="000000"/>
                     </a:solidFill>
@@ -9391,7 +9391,7 @@
               </a:ln>
               <a:extLst>
                 <a:ext uri="{91240B29-F687-4f45-9708-019B960494DF}">
-                  <a14:hiddenLine xmlns="" xmlns:a14="http://schemas.microsoft.com/office/drawing/2010/main" w="9525">
+                  <a14:hiddenLine xmlns:a14="http://schemas.microsoft.com/office/drawing/2010/main" xmlns="" w="9525">
                     <a:solidFill>
                       <a:srgbClr val="000000"/>
                     </a:solidFill>
@@ -9481,7 +9481,7 @@
               </a:ln>
               <a:extLst>
                 <a:ext uri="{91240B29-F687-4f45-9708-019B960494DF}">
-                  <a14:hiddenLine xmlns="" xmlns:a14="http://schemas.microsoft.com/office/drawing/2010/main" w="9525">
+                  <a14:hiddenLine xmlns:a14="http://schemas.microsoft.com/office/drawing/2010/main" xmlns="" w="9525">
                     <a:solidFill>
                       <a:srgbClr val="000000"/>
                     </a:solidFill>
@@ -9543,7 +9543,7 @@
               </a:ln>
               <a:extLst>
                 <a:ext uri="{91240B29-F687-4f45-9708-019B960494DF}">
-                  <a14:hiddenLine xmlns="" xmlns:a14="http://schemas.microsoft.com/office/drawing/2010/main" w="9525">
+                  <a14:hiddenLine xmlns:a14="http://schemas.microsoft.com/office/drawing/2010/main" xmlns="" w="9525">
                     <a:solidFill>
                       <a:srgbClr val="000000"/>
                     </a:solidFill>
@@ -9605,7 +9605,7 @@
               </a:ln>
               <a:extLst>
                 <a:ext uri="{91240B29-F687-4f45-9708-019B960494DF}">
-                  <a14:hiddenLine xmlns="" xmlns:a14="http://schemas.microsoft.com/office/drawing/2010/main" w="9525">
+                  <a14:hiddenLine xmlns:a14="http://schemas.microsoft.com/office/drawing/2010/main" xmlns="" w="9525">
                     <a:solidFill>
                       <a:srgbClr val="000000"/>
                     </a:solidFill>
@@ -9695,7 +9695,7 @@
               </a:ln>
               <a:extLst>
                 <a:ext uri="{91240B29-F687-4f45-9708-019B960494DF}">
-                  <a14:hiddenLine xmlns="" xmlns:a14="http://schemas.microsoft.com/office/drawing/2010/main" w="9525">
+                  <a14:hiddenLine xmlns:a14="http://schemas.microsoft.com/office/drawing/2010/main" xmlns="" w="9525">
                     <a:solidFill>
                       <a:srgbClr val="000000"/>
                     </a:solidFill>
@@ -9785,7 +9785,7 @@
               </a:ln>
               <a:extLst>
                 <a:ext uri="{91240B29-F687-4f45-9708-019B960494DF}">
-                  <a14:hiddenLine xmlns="" xmlns:a14="http://schemas.microsoft.com/office/drawing/2010/main" w="9525">
+                  <a14:hiddenLine xmlns:a14="http://schemas.microsoft.com/office/drawing/2010/main" xmlns="" w="9525">
                     <a:solidFill>
                       <a:srgbClr val="000000"/>
                     </a:solidFill>
@@ -9847,7 +9847,7 @@
               </a:ln>
               <a:extLst>
                 <a:ext uri="{91240B29-F687-4f45-9708-019B960494DF}">
-                  <a14:hiddenLine xmlns="" xmlns:a14="http://schemas.microsoft.com/office/drawing/2010/main" w="9525">
+                  <a14:hiddenLine xmlns:a14="http://schemas.microsoft.com/office/drawing/2010/main" xmlns="" w="9525">
                     <a:solidFill>
                       <a:srgbClr val="000000"/>
                     </a:solidFill>
@@ -9957,7 +9957,7 @@
               </a:ln>
               <a:extLst>
                 <a:ext uri="{91240B29-F687-4f45-9708-019B960494DF}">
-                  <a14:hiddenLine xmlns="" xmlns:a14="http://schemas.microsoft.com/office/drawing/2010/main" w="9525">
+                  <a14:hiddenLine xmlns:a14="http://schemas.microsoft.com/office/drawing/2010/main" xmlns="" w="9525">
                     <a:solidFill>
                       <a:srgbClr val="000000"/>
                     </a:solidFill>
@@ -10041,7 +10041,7 @@
               </a:ln>
               <a:extLst>
                 <a:ext uri="{91240B29-F687-4f45-9708-019B960494DF}">
-                  <a14:hiddenLine xmlns="" xmlns:a14="http://schemas.microsoft.com/office/drawing/2010/main" w="9525">
+                  <a14:hiddenLine xmlns:a14="http://schemas.microsoft.com/office/drawing/2010/main" xmlns="" w="9525">
                     <a:solidFill>
                       <a:srgbClr val="000000"/>
                     </a:solidFill>
@@ -10103,7 +10103,7 @@
               </a:ln>
               <a:extLst>
                 <a:ext uri="{91240B29-F687-4f45-9708-019B960494DF}">
-                  <a14:hiddenLine xmlns="" xmlns:a14="http://schemas.microsoft.com/office/drawing/2010/main" w="9525">
+                  <a14:hiddenLine xmlns:a14="http://schemas.microsoft.com/office/drawing/2010/main" xmlns="" w="9525">
                     <a:solidFill>
                       <a:srgbClr val="000000"/>
                     </a:solidFill>
@@ -10165,7 +10165,7 @@
               </a:ln>
               <a:extLst>
                 <a:ext uri="{91240B29-F687-4f45-9708-019B960494DF}">
-                  <a14:hiddenLine xmlns="" xmlns:a14="http://schemas.microsoft.com/office/drawing/2010/main" w="9525">
+                  <a14:hiddenLine xmlns:a14="http://schemas.microsoft.com/office/drawing/2010/main" xmlns="" w="9525">
                     <a:solidFill>
                       <a:srgbClr val="000000"/>
                     </a:solidFill>
@@ -10255,7 +10255,7 @@
               </a:ln>
               <a:extLst>
                 <a:ext uri="{91240B29-F687-4f45-9708-019B960494DF}">
-                  <a14:hiddenLine xmlns="" xmlns:a14="http://schemas.microsoft.com/office/drawing/2010/main" w="9525">
+                  <a14:hiddenLine xmlns:a14="http://schemas.microsoft.com/office/drawing/2010/main" xmlns="" w="9525">
                     <a:solidFill>
                       <a:srgbClr val="000000"/>
                     </a:solidFill>
@@ -10289,7 +10289,7 @@
               </a:ln>
               <a:extLst>
                 <a:ext uri="{91240B29-F687-4f45-9708-019B960494DF}">
-                  <a14:hiddenLine xmlns="" xmlns:a14="http://schemas.microsoft.com/office/drawing/2010/main" w="9525">
+                  <a14:hiddenLine xmlns:a14="http://schemas.microsoft.com/office/drawing/2010/main" xmlns="" w="9525">
                     <a:solidFill>
                       <a:srgbClr val="000000"/>
                     </a:solidFill>
@@ -10354,7 +10354,7 @@
               </a:ln>
               <a:extLst>
                 <a:ext uri="{91240B29-F687-4f45-9708-019B960494DF}">
-                  <a14:hiddenLine xmlns="" xmlns:a14="http://schemas.microsoft.com/office/drawing/2010/main" w="9525">
+                  <a14:hiddenLine xmlns:a14="http://schemas.microsoft.com/office/drawing/2010/main" xmlns="" w="9525">
                     <a:solidFill>
                       <a:srgbClr val="000000"/>
                     </a:solidFill>
@@ -10444,7 +10444,7 @@
               </a:ln>
               <a:extLst>
                 <a:ext uri="{91240B29-F687-4f45-9708-019B960494DF}">
-                  <a14:hiddenLine xmlns="" xmlns:a14="http://schemas.microsoft.com/office/drawing/2010/main" w="9525">
+                  <a14:hiddenLine xmlns:a14="http://schemas.microsoft.com/office/drawing/2010/main" xmlns="" w="9525">
                     <a:solidFill>
                       <a:srgbClr val="000000"/>
                     </a:solidFill>
@@ -10506,7 +10506,7 @@
               </a:ln>
               <a:extLst>
                 <a:ext uri="{91240B29-F687-4f45-9708-019B960494DF}">
-                  <a14:hiddenLine xmlns="" xmlns:a14="http://schemas.microsoft.com/office/drawing/2010/main" w="9525">
+                  <a14:hiddenLine xmlns:a14="http://schemas.microsoft.com/office/drawing/2010/main" xmlns="" w="9525">
                     <a:solidFill>
                       <a:srgbClr val="000000"/>
                     </a:solidFill>
@@ -10596,7 +10596,7 @@
               </a:ln>
               <a:extLst>
                 <a:ext uri="{91240B29-F687-4f45-9708-019B960494DF}">
-                  <a14:hiddenLine xmlns="" xmlns:a14="http://schemas.microsoft.com/office/drawing/2010/main" w="9525">
+                  <a14:hiddenLine xmlns:a14="http://schemas.microsoft.com/office/drawing/2010/main" xmlns="" w="9525">
                     <a:solidFill>
                       <a:srgbClr val="000000"/>
                     </a:solidFill>
@@ -10661,7 +10661,7 @@
               </a:ln>
               <a:extLst>
                 <a:ext uri="{91240B29-F687-4f45-9708-019B960494DF}">
-                  <a14:hiddenLine xmlns="" xmlns:a14="http://schemas.microsoft.com/office/drawing/2010/main" w="9525">
+                  <a14:hiddenLine xmlns:a14="http://schemas.microsoft.com/office/drawing/2010/main" xmlns="" w="9525">
                     <a:solidFill>
                       <a:srgbClr val="000000"/>
                     </a:solidFill>
@@ -10723,7 +10723,7 @@
               </a:ln>
               <a:extLst>
                 <a:ext uri="{91240B29-F687-4f45-9708-019B960494DF}">
-                  <a14:hiddenLine xmlns="" xmlns:a14="http://schemas.microsoft.com/office/drawing/2010/main" w="9525">
+                  <a14:hiddenLine xmlns:a14="http://schemas.microsoft.com/office/drawing/2010/main" xmlns="" w="9525">
                     <a:solidFill>
                       <a:srgbClr val="000000"/>
                     </a:solidFill>
@@ -10813,7 +10813,7 @@
               </a:ln>
               <a:extLst>
                 <a:ext uri="{91240B29-F687-4f45-9708-019B960494DF}">
-                  <a14:hiddenLine xmlns="" xmlns:a14="http://schemas.microsoft.com/office/drawing/2010/main" w="9525">
+                  <a14:hiddenLine xmlns:a14="http://schemas.microsoft.com/office/drawing/2010/main" xmlns="" w="9525">
                     <a:solidFill>
                       <a:srgbClr val="000000"/>
                     </a:solidFill>
@@ -10903,7 +10903,7 @@
               </a:ln>
               <a:extLst>
                 <a:ext uri="{91240B29-F687-4f45-9708-019B960494DF}">
-                  <a14:hiddenLine xmlns="" xmlns:a14="http://schemas.microsoft.com/office/drawing/2010/main" w="9525">
+                  <a14:hiddenLine xmlns:a14="http://schemas.microsoft.com/office/drawing/2010/main" xmlns="" w="9525">
                     <a:solidFill>
                       <a:srgbClr val="000000"/>
                     </a:solidFill>
@@ -10968,7 +10968,7 @@
               </a:ln>
               <a:extLst>
                 <a:ext uri="{91240B29-F687-4f45-9708-019B960494DF}">
-                  <a14:hiddenLine xmlns="" xmlns:a14="http://schemas.microsoft.com/office/drawing/2010/main" w="9525">
+                  <a14:hiddenLine xmlns:a14="http://schemas.microsoft.com/office/drawing/2010/main" xmlns="" w="9525">
                     <a:solidFill>
                       <a:srgbClr val="000000"/>
                     </a:solidFill>
@@ -11088,7 +11088,7 @@
               </a:ln>
               <a:extLst>
                 <a:ext uri="{91240B29-F687-4f45-9708-019B960494DF}">
-                  <a14:hiddenLine xmlns="" xmlns:a14="http://schemas.microsoft.com/office/drawing/2010/main" w="9525">
+                  <a14:hiddenLine xmlns:a14="http://schemas.microsoft.com/office/drawing/2010/main" xmlns="" w="9525">
                     <a:solidFill>
                       <a:srgbClr val="000000"/>
                     </a:solidFill>
@@ -11169,7 +11169,7 @@
               </a:ln>
               <a:extLst>
                 <a:ext uri="{91240B29-F687-4f45-9708-019B960494DF}">
-                  <a14:hiddenLine xmlns="" xmlns:a14="http://schemas.microsoft.com/office/drawing/2010/main" w="9525">
+                  <a14:hiddenLine xmlns:a14="http://schemas.microsoft.com/office/drawing/2010/main" xmlns="" w="9525">
                     <a:solidFill>
                       <a:srgbClr val="000000"/>
                     </a:solidFill>
@@ -11284,7 +11284,7 @@
               </a:ln>
               <a:extLst>
                 <a:ext uri="{91240B29-F687-4f45-9708-019B960494DF}">
-                  <a14:hiddenLine xmlns="" xmlns:a14="http://schemas.microsoft.com/office/drawing/2010/main" w="9525">
+                  <a14:hiddenLine xmlns:a14="http://schemas.microsoft.com/office/drawing/2010/main" xmlns="" w="9525">
                     <a:solidFill>
                       <a:srgbClr val="000000"/>
                     </a:solidFill>
@@ -11374,7 +11374,7 @@
               </a:ln>
               <a:extLst>
                 <a:ext uri="{91240B29-F687-4f45-9708-019B960494DF}">
-                  <a14:hiddenLine xmlns="" xmlns:a14="http://schemas.microsoft.com/office/drawing/2010/main" w="9525">
+                  <a14:hiddenLine xmlns:a14="http://schemas.microsoft.com/office/drawing/2010/main" xmlns="" w="9525">
                     <a:solidFill>
                       <a:srgbClr val="000000"/>
                     </a:solidFill>
@@ -11439,7 +11439,7 @@
               </a:ln>
               <a:extLst>
                 <a:ext uri="{91240B29-F687-4f45-9708-019B960494DF}">
-                  <a14:hiddenLine xmlns="" xmlns:a14="http://schemas.microsoft.com/office/drawing/2010/main" w="9525">
+                  <a14:hiddenLine xmlns:a14="http://schemas.microsoft.com/office/drawing/2010/main" xmlns="" w="9525">
                     <a:solidFill>
                       <a:srgbClr val="000000"/>
                     </a:solidFill>
@@ -11529,7 +11529,7 @@
               </a:ln>
               <a:extLst>
                 <a:ext uri="{91240B29-F687-4f45-9708-019B960494DF}">
-                  <a14:hiddenLine xmlns="" xmlns:a14="http://schemas.microsoft.com/office/drawing/2010/main" w="9525">
+                  <a14:hiddenLine xmlns:a14="http://schemas.microsoft.com/office/drawing/2010/main" xmlns="" w="9525">
                     <a:solidFill>
                       <a:srgbClr val="000000"/>
                     </a:solidFill>
@@ -11597,7 +11597,7 @@
               </a:ln>
               <a:extLst>
                 <a:ext uri="{91240B29-F687-4f45-9708-019B960494DF}">
-                  <a14:hiddenLine xmlns="" xmlns:a14="http://schemas.microsoft.com/office/drawing/2010/main" w="9525">
+                  <a14:hiddenLine xmlns:a14="http://schemas.microsoft.com/office/drawing/2010/main" xmlns="" w="9525">
                     <a:solidFill>
                       <a:srgbClr val="000000"/>
                     </a:solidFill>
@@ -11687,7 +11687,7 @@
               </a:ln>
               <a:extLst>
                 <a:ext uri="{91240B29-F687-4f45-9708-019B960494DF}">
-                  <a14:hiddenLine xmlns="" xmlns:a14="http://schemas.microsoft.com/office/drawing/2010/main" w="9525">
+                  <a14:hiddenLine xmlns:a14="http://schemas.microsoft.com/office/drawing/2010/main" xmlns="" w="9525">
                     <a:solidFill>
                       <a:srgbClr val="000000"/>
                     </a:solidFill>
@@ -11755,7 +11755,7 @@
               </a:ln>
               <a:extLst>
                 <a:ext uri="{91240B29-F687-4f45-9708-019B960494DF}">
-                  <a14:hiddenLine xmlns="" xmlns:a14="http://schemas.microsoft.com/office/drawing/2010/main" w="9525">
+                  <a14:hiddenLine xmlns:a14="http://schemas.microsoft.com/office/drawing/2010/main" xmlns="" w="9525">
                     <a:solidFill>
                       <a:srgbClr val="000000"/>
                     </a:solidFill>
@@ -11845,7 +11845,7 @@
               </a:ln>
               <a:extLst>
                 <a:ext uri="{91240B29-F687-4f45-9708-019B960494DF}">
-                  <a14:hiddenLine xmlns="" xmlns:a14="http://schemas.microsoft.com/office/drawing/2010/main" w="9525">
+                  <a14:hiddenLine xmlns:a14="http://schemas.microsoft.com/office/drawing/2010/main" xmlns="" w="9525">
                     <a:solidFill>
                       <a:srgbClr val="000000"/>
                     </a:solidFill>
@@ -11879,7 +11879,7 @@
               </a:ln>
               <a:extLst>
                 <a:ext uri="{91240B29-F687-4f45-9708-019B960494DF}">
-                  <a14:hiddenLine xmlns="" xmlns:a14="http://schemas.microsoft.com/office/drawing/2010/main" w="9525">
+                  <a14:hiddenLine xmlns:a14="http://schemas.microsoft.com/office/drawing/2010/main" xmlns="" w="9525">
                     <a:solidFill>
                       <a:srgbClr val="000000"/>
                     </a:solidFill>
@@ -12457,7 +12457,7 @@
         </p:nvSpPr>
         <p:spPr>
           <a:xfrm>
-            <a:off x="1859880" y="528804"/>
+            <a:off x="1700212" y="952856"/>
             <a:ext cx="8791575" cy="4135437"/>
           </a:xfrm>
         </p:spPr>
@@ -12469,86 +12469,116 @@
           <a:p>
             <a:pPr algn="ctr"/>
             <a:br>
-              <a:rPr lang="fr-FR" dirty="0"/>
+              <a:rPr lang="fr-FR" dirty="0">
+                <a:latin typeface="+mn-lt"/>
+              </a:rPr>
             </a:br>
             <a:br>
-              <a:rPr lang="fr-FR" dirty="0"/>
+              <a:rPr lang="fr-FR" dirty="0">
+                <a:latin typeface="+mn-lt"/>
+              </a:rPr>
             </a:br>
             <a:br>
-              <a:rPr lang="fr-FR" dirty="0"/>
+              <a:rPr lang="fr-FR" dirty="0">
+                <a:latin typeface="+mn-lt"/>
+              </a:rPr>
             </a:br>
             <a:br>
-              <a:rPr lang="fr-FR" dirty="0"/>
+              <a:rPr lang="fr-FR" dirty="0">
+                <a:latin typeface="+mn-lt"/>
+              </a:rPr>
             </a:br>
             <a:br>
-              <a:rPr lang="fr-FR" dirty="0"/>
+              <a:rPr lang="fr-FR" dirty="0">
+                <a:latin typeface="+mn-lt"/>
+              </a:rPr>
             </a:br>
             <a:br>
-              <a:rPr lang="fr-FR" dirty="0"/>
+              <a:rPr lang="fr-FR" dirty="0">
+                <a:latin typeface="+mn-lt"/>
+              </a:rPr>
             </a:br>
             <a:br>
-              <a:rPr lang="fr-FR" dirty="0"/>
+              <a:rPr lang="fr-FR" dirty="0">
+                <a:latin typeface="+mn-lt"/>
+              </a:rPr>
             </a:br>
             <a:r>
               <a:rPr lang="fr-FR" dirty="0">
-                <a:latin typeface="-apple-system"/>
+                <a:latin typeface="+mn-lt"/>
               </a:rPr>
               <a:t>inflation </a:t>
             </a:r>
             <a:r>
               <a:rPr lang="fr-FR" dirty="0" err="1">
-                <a:latin typeface="-apple-system"/>
+                <a:latin typeface="+mn-lt"/>
               </a:rPr>
               <a:t>corrected</a:t>
             </a:r>
             <a:r>
               <a:rPr lang="fr-FR" dirty="0">
-                <a:latin typeface="-apple-system"/>
+                <a:latin typeface="+mn-lt"/>
               </a:rPr>
               <a:t> </a:t>
             </a:r>
             <a:r>
               <a:rPr lang="fr-FR" dirty="0" err="1">
-                <a:latin typeface="-apple-system"/>
+                <a:latin typeface="+mn-lt"/>
               </a:rPr>
               <a:t>household</a:t>
             </a:r>
             <a:r>
               <a:rPr lang="fr-FR" dirty="0">
-                <a:latin typeface="-apple-system"/>
+                <a:latin typeface="+mn-lt"/>
               </a:rPr>
               <a:t> </a:t>
             </a:r>
             <a:r>
               <a:rPr lang="fr-FR" dirty="0" err="1">
-                <a:latin typeface="-apple-system"/>
+                <a:latin typeface="+mn-lt"/>
               </a:rPr>
               <a:t>consumption</a:t>
             </a:r>
             <a:r>
               <a:rPr lang="fr-FR" dirty="0">
-                <a:latin typeface="-apple-system"/>
+                <a:latin typeface="+mn-lt"/>
               </a:rPr>
               <a:t> composite index</a:t>
             </a:r>
             <a:br>
               <a:rPr lang="fr-FR" dirty="0">
-                <a:latin typeface="-apple-system"/>
+                <a:latin typeface="+mn-lt"/>
               </a:rPr>
             </a:br>
-            <a:r>
-              <a:rPr lang="fr-FR" b="1" dirty="0">
-                <a:latin typeface="-apple-system"/>
-              </a:rPr>
-              <a:t>aka I.C.H.C.C.I</a:t>
-            </a:r>
             <a:br>
               <a:rPr lang="fr-FR" dirty="0">
-                <a:latin typeface="-apple-system"/>
+                <a:latin typeface="+mn-lt"/>
               </a:rPr>
             </a:br>
+            <a:r>
+              <a:rPr lang="fr-FR" b="1" dirty="0">
+                <a:latin typeface="+mn-lt"/>
+              </a:rPr>
+              <a:t>aka </a:t>
+            </a:r>
+            <a:br>
+              <a:rPr lang="fr-FR" b="1" dirty="0">
+                <a:latin typeface="+mn-lt"/>
+              </a:rPr>
+            </a:br>
+            <a:br>
+              <a:rPr lang="fr-FR" b="1" dirty="0">
+                <a:latin typeface="+mn-lt"/>
+              </a:rPr>
+            </a:br>
+            <a:r>
+              <a:rPr lang="fr-FR" b="1" dirty="0">
+                <a:latin typeface="+mn-lt"/>
+              </a:rPr>
+              <a:t>I.C.H.C.C.I.</a:t>
+            </a:r>
             <a:endParaRPr lang="fr-FR" dirty="0">
-              <a:latin typeface="-apple-system"/>
+              <a:latin typeface="+mn-lt"/>
             </a:endParaRPr>
           </a:p>
         </p:txBody>
@@ -12593,6 +12623,7 @@
             <a:endParaRPr lang="fr-FR" dirty="0"/>
           </a:p>
           <a:p>
+            <a:pPr algn="ctr"/>
             <a:r>
               <a:rPr lang="fr-FR" sz="8000" dirty="0"/>
               <a:t>By </a:t>
@@ -12603,7 +12634,27 @@
             </a:r>
             <a:r>
               <a:rPr lang="fr-FR" sz="8000" dirty="0"/>
-              <a:t> _ Louis _ Robin</a:t>
+              <a:t> </a:t>
+            </a:r>
+            <a:r>
+              <a:rPr lang="fr-FR" sz="4800" dirty="0"/>
+              <a:t>#sql.expert</a:t>
+            </a:r>
+            <a:r>
+              <a:rPr lang="fr-FR" sz="8000" dirty="0"/>
+              <a:t>__Louis </a:t>
+            </a:r>
+            <a:r>
+              <a:rPr lang="fr-FR" sz="4800" dirty="0"/>
+              <a:t>#Py.prog.expert</a:t>
+            </a:r>
+            <a:r>
+              <a:rPr lang="fr-FR" sz="8000" dirty="0"/>
+              <a:t>__Robin </a:t>
+            </a:r>
+            <a:r>
+              <a:rPr lang="fr-FR" sz="4800" dirty="0"/>
+              <a:t>#AVG.dogooder</a:t>
             </a:r>
           </a:p>
         </p:txBody>
@@ -12662,38 +12713,26 @@
           <a:lstStyle/>
           <a:p>
             <a:r>
-              <a:rPr lang="en-US" sz="3600" dirty="0">
-                <a:latin typeface="-apple-system"/>
-              </a:rPr>
+              <a:rPr lang="en-US" sz="3600" dirty="0"/>
               <a:t>Description of your Project (Planning, ER, </a:t>
             </a:r>
             <a:r>
-              <a:rPr lang="en-US" sz="3600" dirty="0" err="1">
-                <a:latin typeface="-apple-system"/>
-              </a:rPr>
+              <a:rPr lang="en-US" sz="3600" dirty="0" err="1"/>
               <a:t>DataBase</a:t>
             </a:r>
             <a:r>
-              <a:rPr lang="en-US" sz="3600" dirty="0">
-                <a:latin typeface="-apple-system"/>
-              </a:rPr>
+              <a:rPr lang="en-US" sz="3600" dirty="0"/>
               <a:t> Schema, Queries, </a:t>
             </a:r>
             <a:r>
-              <a:rPr lang="en-US" sz="3600" dirty="0" err="1">
-                <a:latin typeface="-apple-system"/>
-              </a:rPr>
+              <a:rPr lang="en-US" sz="3600" dirty="0" err="1"/>
               <a:t>MethodoloGy</a:t>
             </a:r>
             <a:r>
-              <a:rPr lang="en-US" sz="3600" dirty="0">
-                <a:latin typeface="-apple-system"/>
-              </a:rPr>
+              <a:rPr lang="en-US" sz="3600" dirty="0"/>
               <a:t> for the composite indicator) :</a:t>
             </a:r>
-            <a:endParaRPr lang="fr-FR" sz="3600" dirty="0">
-              <a:latin typeface="-apple-system"/>
-            </a:endParaRPr>
+            <a:endParaRPr lang="fr-FR" sz="3600" dirty="0"/>
           </a:p>
         </p:txBody>
       </p:sp>
@@ -12716,16 +12755,35 @@
         <p:spPr/>
         <p:txBody>
           <a:bodyPr>
-            <a:normAutofit/>
+            <a:normAutofit fontScale="92500" lnSpcReduction="10000"/>
           </a:bodyPr>
           <a:lstStyle/>
           <a:p>
-            <a:endParaRPr lang="fr-FR" dirty="0"/>
+            <a:r>
+              <a:rPr lang="fr-FR" dirty="0"/>
+              <a:t>On. The. Fly.</a:t>
+            </a:r>
           </a:p>
           <a:p>
             <a:r>
               <a:rPr lang="fr-FR" dirty="0" err="1"/>
-              <a:t>We</a:t>
+              <a:t>Went</a:t>
+            </a:r>
+            <a:r>
+              <a:rPr lang="fr-FR" dirty="0"/>
+              <a:t> for </a:t>
+            </a:r>
+            <a:r>
+              <a:rPr lang="fr-FR" dirty="0" err="1"/>
+              <a:t>healthcare</a:t>
+            </a:r>
+            <a:r>
+              <a:rPr lang="fr-FR" dirty="0"/>
+              <a:t> – mixed </a:t>
+            </a:r>
+            <a:r>
+              <a:rPr lang="fr-FR" dirty="0" err="1"/>
+              <a:t>it</a:t>
             </a:r>
             <a:r>
               <a:rPr lang="fr-FR" dirty="0"/>
@@ -12733,19 +12791,11 @@
             </a:r>
             <a:r>
               <a:rPr lang="fr-FR" dirty="0" err="1"/>
-              <a:t>went</a:t>
+              <a:t>with</a:t>
             </a:r>
             <a:r>
               <a:rPr lang="fr-FR" dirty="0"/>
-              <a:t> for </a:t>
-            </a:r>
-            <a:r>
-              <a:rPr lang="fr-FR" dirty="0" err="1"/>
-              <a:t>healthcare</a:t>
-            </a:r>
-            <a:r>
-              <a:rPr lang="fr-FR" dirty="0"/>
-              <a:t> – </a:t>
+              <a:t> business – </a:t>
             </a:r>
             <a:r>
               <a:rPr lang="fr-FR" dirty="0" err="1"/>
@@ -12753,11 +12803,37 @@
             </a:r>
             <a:r>
               <a:rPr lang="fr-FR" dirty="0"/>
-              <a:t> up </a:t>
+              <a:t> up in </a:t>
             </a:r>
             <a:r>
               <a:rPr lang="fr-FR" dirty="0" err="1"/>
-              <a:t>mixing</a:t>
+              <a:t>economics</a:t>
+            </a:r>
+            <a:r>
+              <a:rPr lang="fr-FR" dirty="0"/>
+              <a:t>.</a:t>
+            </a:r>
+          </a:p>
+          <a:p>
+            <a:r>
+              <a:rPr lang="fr-FR" dirty="0" err="1"/>
+              <a:t>Comparing</a:t>
+            </a:r>
+            <a:r>
+              <a:rPr lang="fr-FR" dirty="0"/>
+              <a:t> the </a:t>
+            </a:r>
+            <a:r>
+              <a:rPr lang="fr-FR" dirty="0" err="1"/>
+              <a:t>scales</a:t>
+            </a:r>
+            <a:r>
+              <a:rPr lang="fr-FR" dirty="0"/>
+              <a:t> /</a:t>
+            </a:r>
+            <a:r>
+              <a:rPr lang="fr-FR" dirty="0" err="1"/>
+              <a:t>measurement</a:t>
             </a:r>
             <a:r>
               <a:rPr lang="fr-FR" dirty="0"/>
@@ -12765,7 +12841,22 @@
             </a:r>
             <a:r>
               <a:rPr lang="fr-FR" dirty="0" err="1"/>
-              <a:t>it</a:t>
+              <a:t>units</a:t>
+            </a:r>
+            <a:r>
+              <a:rPr lang="fr-FR" dirty="0"/>
+              <a:t> : compatible =&gt; </a:t>
+            </a:r>
+            <a:r>
+              <a:rPr lang="fr-FR" dirty="0" err="1"/>
+              <a:t>greenlight</a:t>
+            </a:r>
+            <a:endParaRPr lang="fr-FR" dirty="0"/>
+          </a:p>
+          <a:p>
+            <a:r>
+              <a:rPr lang="fr-FR" dirty="0" err="1"/>
+              <a:t>Elaborating</a:t>
             </a:r>
             <a:r>
               <a:rPr lang="fr-FR" dirty="0"/>
@@ -12773,25 +12864,38 @@
             </a:r>
             <a:r>
               <a:rPr lang="fr-FR" dirty="0" err="1"/>
+              <a:t>CSVs</a:t>
+            </a:r>
+            <a:r>
+              <a:rPr lang="fr-FR" dirty="0"/>
+              <a:t> </a:t>
+            </a:r>
+            <a:r>
+              <a:rPr lang="fr-FR" dirty="0" err="1"/>
               <a:t>with</a:t>
             </a:r>
             <a:r>
               <a:rPr lang="fr-FR" dirty="0"/>
-              <a:t> business on the </a:t>
+              <a:t> Python </a:t>
             </a:r>
             <a:r>
               <a:rPr lang="fr-FR" dirty="0" err="1"/>
-              <a:t>way</a:t>
+              <a:t>Programming</a:t>
             </a:r>
             <a:endParaRPr lang="fr-FR" dirty="0"/>
           </a:p>
           <a:p>
-            <a:endParaRPr lang="fr-FR" dirty="0"/>
-          </a:p>
-          <a:p>
             <a:r>
               <a:rPr lang="fr-FR" dirty="0" err="1"/>
-              <a:t>Comparing</a:t>
+              <a:t>Decided</a:t>
+            </a:r>
+            <a:r>
+              <a:rPr lang="fr-FR" dirty="0"/>
+              <a:t> to export tables </a:t>
+            </a:r>
+            <a:r>
+              <a:rPr lang="fr-FR" dirty="0" err="1"/>
+              <a:t>through</a:t>
             </a:r>
             <a:r>
               <a:rPr lang="fr-FR" dirty="0"/>
@@ -12799,40 +12903,6 @@
             </a:r>
             <a:r>
               <a:rPr lang="fr-FR" dirty="0" err="1"/>
-              <a:t>scales</a:t>
-            </a:r>
-            <a:r>
-              <a:rPr lang="fr-FR" dirty="0"/>
-              <a:t> of data : </a:t>
-            </a:r>
-            <a:r>
-              <a:rPr lang="fr-FR" dirty="0" err="1"/>
-              <a:t>greenlight</a:t>
-            </a:r>
-            <a:endParaRPr lang="fr-FR" dirty="0"/>
-          </a:p>
-          <a:p>
-            <a:endParaRPr lang="fr-FR" dirty="0"/>
-          </a:p>
-          <a:p>
-            <a:r>
-              <a:rPr lang="fr-FR" dirty="0" err="1"/>
-              <a:t>Decided</a:t>
-            </a:r>
-            <a:r>
-              <a:rPr lang="fr-FR" dirty="0"/>
-              <a:t> to export tables </a:t>
-            </a:r>
-            <a:r>
-              <a:rPr lang="fr-FR" dirty="0" err="1"/>
-              <a:t>through</a:t>
-            </a:r>
-            <a:r>
-              <a:rPr lang="fr-FR" dirty="0"/>
-              <a:t> the </a:t>
-            </a:r>
-            <a:r>
-              <a:rPr lang="fr-FR" dirty="0" err="1"/>
               <a:t>Wizard</a:t>
             </a:r>
             <a:r>
@@ -12843,6 +12913,63 @@
               <a:rPr lang="fr-FR" dirty="0" err="1"/>
               <a:t>efficiency</a:t>
             </a:r>
+            <a:endParaRPr lang="fr-FR" dirty="0"/>
+          </a:p>
+          <a:p>
+            <a:r>
+              <a:rPr lang="fr-FR" dirty="0"/>
+              <a:t>ICHCCI ? </a:t>
+            </a:r>
+            <a:r>
+              <a:rPr lang="fr-FR" dirty="0" err="1"/>
+              <a:t>What</a:t>
+            </a:r>
+            <a:r>
+              <a:rPr lang="fr-FR" dirty="0"/>
+              <a:t> </a:t>
+            </a:r>
+            <a:r>
+              <a:rPr lang="fr-FR" dirty="0" err="1"/>
+              <a:t>would</a:t>
+            </a:r>
+            <a:r>
+              <a:rPr lang="fr-FR" dirty="0"/>
+              <a:t> </a:t>
+            </a:r>
+            <a:r>
+              <a:rPr lang="fr-FR" dirty="0" err="1"/>
+              <a:t>make</a:t>
+            </a:r>
+            <a:r>
+              <a:rPr lang="fr-FR" dirty="0"/>
+              <a:t> </a:t>
+            </a:r>
+            <a:r>
+              <a:rPr lang="fr-FR" dirty="0" err="1"/>
+              <a:t>sense</a:t>
+            </a:r>
+            <a:r>
+              <a:rPr lang="fr-FR" dirty="0"/>
+              <a:t> ? Evolution of Final </a:t>
+            </a:r>
+            <a:r>
+              <a:rPr lang="fr-FR" dirty="0" err="1"/>
+              <a:t>Consumption</a:t>
+            </a:r>
+            <a:r>
+              <a:rPr lang="fr-FR" dirty="0"/>
+              <a:t> </a:t>
+            </a:r>
+            <a:r>
+              <a:rPr lang="fr-FR" dirty="0" err="1"/>
+              <a:t>Expenditure</a:t>
+            </a:r>
+            <a:r>
+              <a:rPr lang="fr-FR" dirty="0"/>
+              <a:t>/Imports</a:t>
+            </a:r>
+          </a:p>
+          <a:p>
             <a:endParaRPr lang="fr-FR" dirty="0"/>
           </a:p>
           <a:p>
@@ -12964,7 +13091,7 @@
         </p:blipFill>
         <p:spPr>
           <a:xfrm>
-            <a:off x="523708" y="0"/>
+            <a:off x="523708" y="254995"/>
             <a:ext cx="11141405" cy="6348010"/>
           </a:xfrm>
           <a:prstGeom prst="rect">
@@ -13034,7 +13161,7 @@
             </a:r>
             <a:r>
               <a:rPr lang="fr-FR" dirty="0"/>
-              <a:t> but </a:t>
+              <a:t> at first but </a:t>
             </a:r>
             <a:r>
               <a:rPr lang="fr-FR" dirty="0" err="1"/>
@@ -13126,7 +13253,7 @@
         </p:nvSpPr>
         <p:spPr>
           <a:xfrm>
-            <a:off x="77723" y="263954"/>
+            <a:off x="160136" y="345234"/>
             <a:ext cx="7713339" cy="45719"/>
           </a:xfrm>
         </p:spPr>
@@ -13180,7 +13307,7 @@
         </p:blipFill>
         <p:spPr>
           <a:xfrm>
-            <a:off x="160136" y="608051"/>
+            <a:off x="160136" y="664587"/>
             <a:ext cx="11871728" cy="2784181"/>
           </a:xfrm>
         </p:spPr>
@@ -13229,7 +13356,7 @@
         </p:nvSpPr>
         <p:spPr>
           <a:xfrm>
-            <a:off x="77723" y="3505305"/>
+            <a:off x="160136" y="3572106"/>
             <a:ext cx="7186904" cy="584775"/>
           </a:xfrm>
           <a:prstGeom prst="rect">
@@ -13601,16 +13728,9 @@
             <a:r>
               <a:rPr lang="fr-FR" sz="3600" b="0" i="0" dirty="0">
                 <a:effectLst/>
-                <a:latin typeface="-apple-system"/>
               </a:rPr>
               <a:t>Challenges &amp; Highlights :</a:t>
             </a:r>
-            <a:br>
-              <a:rPr lang="fr-FR" sz="3600" b="0" i="0" dirty="0">
-                <a:effectLst/>
-                <a:latin typeface="-apple-system"/>
-              </a:rPr>
-            </a:br>
             <a:endParaRPr lang="fr-FR" sz="3600" dirty="0"/>
           </a:p>
         </p:txBody>
@@ -14180,44 +14300,33 @@
             <a:r>
               <a:rPr lang="fr-FR" sz="3600" b="0" i="0" dirty="0">
                 <a:effectLst/>
-                <a:latin typeface="-apple-system"/>
               </a:rPr>
               <a:t>Main </a:t>
             </a:r>
             <a:r>
               <a:rPr lang="fr-FR" sz="3600" b="0" i="0" dirty="0" err="1">
                 <a:effectLst/>
-                <a:latin typeface="-apple-system"/>
               </a:rPr>
               <a:t>result</a:t>
             </a:r>
             <a:r>
               <a:rPr lang="fr-FR" sz="3600" b="0" i="0" dirty="0">
                 <a:effectLst/>
-                <a:latin typeface="-apple-system"/>
               </a:rPr>
               <a:t> &amp; </a:t>
             </a:r>
             <a:r>
               <a:rPr lang="fr-FR" sz="3600" b="0" i="0" dirty="0" err="1">
                 <a:effectLst/>
-                <a:latin typeface="-apple-system"/>
               </a:rPr>
               <a:t>demo</a:t>
             </a:r>
             <a:r>
               <a:rPr lang="fr-FR" sz="3600" b="0" i="0" dirty="0">
                 <a:effectLst/>
-                <a:latin typeface="-apple-system"/>
               </a:rPr>
               <a:t>:</a:t>
             </a:r>
-            <a:br>
-              <a:rPr lang="fr-FR" sz="3600" b="0" i="0" dirty="0">
-                <a:effectLst/>
-                <a:latin typeface="-apple-system"/>
-              </a:rPr>
-            </a:br>
             <a:endParaRPr lang="fr-FR" sz="3600" dirty="0"/>
           </a:p>
         </p:txBody>
@@ -14544,7 +14653,7 @@
 <file path=ppt/theme/theme1.xml><?xml version="1.0" encoding="utf-8"?>
 <a:theme xmlns:a="http://schemas.openxmlformats.org/drawingml/2006/main" name="Circuit">
   <a:themeElements>
-    <a:clrScheme name="Circuit">
+    <a:clrScheme name="Red">
       <a:dk1>
         <a:sysClr val="windowText" lastClr="000000"/>
       </a:dk1>
@@ -14552,34 +14661,34 @@
         <a:sysClr val="window" lastClr="FFFFFF"/>
       </a:lt1>
       <a:dk2>
-        <a:srgbClr val="252C36"/>
+        <a:srgbClr val="323232"/>
       </a:dk2>
       <a:lt2>
-        <a:srgbClr val="7C96A3"/>
+        <a:srgbClr val="E5C243"/>
       </a:lt2>
       <a:accent1>
-        <a:srgbClr val="4FD093"/>
+        <a:srgbClr val="A5300F"/>
       </a:accent1>
       <a:accent2>
-        <a:srgbClr val="54BCDF"/>
+        <a:srgbClr val="D55816"/>
       </a:accent2>
       <a:accent3>
-        <a:srgbClr val="A262D0"/>
+        <a:srgbClr val="E19825"/>
       </a:accent3>
       <a:accent4>
-        <a:srgbClr val="D7537B"/>
+        <a:srgbClr val="B19C7D"/>
       </a:accent4>
       <a:accent5>
-        <a:srgbClr val="E78045"/>
+        <a:srgbClr val="7F5F52"/>
       </a:accent5>
       <a:accent6>
-        <a:srgbClr val="84C350"/>
+        <a:srgbClr val="B27D49"/>
       </a:accent6>
       <a:hlink>
-        <a:srgbClr val="22FFFF"/>
+        <a:srgbClr val="6B9F25"/>
       </a:hlink>
       <a:folHlink>
-        <a:srgbClr val="9BF3FD"/>
+        <a:srgbClr val="B26B02"/>
       </a:folHlink>
     </a:clrScheme>
     <a:fontScheme name="Circuit">

</xml_diff>

<commit_message>
Updated pptx yet again
</commit_message>
<xml_diff>
--- a/ICHCCI.pptx
+++ b/ICHCCI.pptx
@@ -13205,6 +13205,82 @@
           </a:p>
         </p:txBody>
       </p:sp>
+      <p:cxnSp>
+        <p:nvCxnSpPr>
+          <p:cNvPr id="11" name="Straight Arrow Connector 10">
+            <a:extLst>
+              <a:ext uri="{FF2B5EF4-FFF2-40B4-BE49-F238E27FC236}">
+                <a16:creationId xmlns:a16="http://schemas.microsoft.com/office/drawing/2014/main" id="{6278AC3D-3FF0-E8BF-D89B-B0602159241D}"/>
+              </a:ext>
+            </a:extLst>
+          </p:cNvPr>
+          <p:cNvCxnSpPr>
+            <a:cxnSpLocks/>
+          </p:cNvCxnSpPr>
+          <p:nvPr/>
+        </p:nvCxnSpPr>
+        <p:spPr>
+          <a:xfrm flipH="1" flipV="1">
+            <a:off x="3251200" y="5882640"/>
+            <a:ext cx="1700245" cy="508000"/>
+          </a:xfrm>
+          <a:prstGeom prst="straightConnector1">
+            <a:avLst/>
+          </a:prstGeom>
+          <a:ln>
+            <a:tailEnd type="triangle"/>
+          </a:ln>
+        </p:spPr>
+        <p:style>
+          <a:lnRef idx="1">
+            <a:schemeClr val="accent1"/>
+          </a:lnRef>
+          <a:fillRef idx="0">
+            <a:schemeClr val="accent1"/>
+          </a:fillRef>
+          <a:effectRef idx="0">
+            <a:schemeClr val="accent1"/>
+          </a:effectRef>
+          <a:fontRef idx="minor">
+            <a:schemeClr val="tx1"/>
+          </a:fontRef>
+        </p:style>
+      </p:cxnSp>
+      <p:sp>
+        <p:nvSpPr>
+          <p:cNvPr id="13" name="TextBox 12">
+            <a:extLst>
+              <a:ext uri="{FF2B5EF4-FFF2-40B4-BE49-F238E27FC236}">
+                <a16:creationId xmlns:a16="http://schemas.microsoft.com/office/drawing/2014/main" id="{9DD7A591-15B6-063F-698F-B8F54B42CB55}"/>
+              </a:ext>
+            </a:extLst>
+          </p:cNvPr>
+          <p:cNvSpPr txBox="1"/>
+          <p:nvPr/>
+        </p:nvSpPr>
+        <p:spPr>
+          <a:xfrm>
+            <a:off x="4951445" y="6279393"/>
+            <a:ext cx="982961" cy="246221"/>
+          </a:xfrm>
+          <a:prstGeom prst="rect">
+            <a:avLst/>
+          </a:prstGeom>
+          <a:noFill/>
+        </p:spPr>
+        <p:txBody>
+          <a:bodyPr wrap="none" rtlCol="0">
+            <a:spAutoFit/>
+          </a:bodyPr>
+          <a:lstStyle/>
+          <a:p>
+            <a:r>
+              <a:rPr lang="fr-FR" sz="1000" dirty="0"/>
+              <a:t>6:15pm update</a:t>
+            </a:r>
+          </a:p>
+        </p:txBody>
+      </p:sp>
     </p:spTree>
     <p:extLst>
       <p:ext uri="{BB962C8B-B14F-4D97-AF65-F5344CB8AC3E}">

</xml_diff>

<commit_message>
Changes from Axèle updated
</commit_message>
<xml_diff>
--- a/ICHCCI.pptx
+++ b/ICHCCI.pptx
@@ -176,7 +176,7 @@
           <a:noFill/>
           <a:extLst>
             <a:ext uri="{909E8E84-426E-40dd-AFC4-6F175D3DCCD1}">
-              <a14:hiddenFill xmlns:a14="http://schemas.microsoft.com/office/drawing/2010/main" xmlns="">
+              <a14:hiddenFill xmlns="" xmlns:a14="http://schemas.microsoft.com/office/drawing/2010/main">
                 <a:solidFill>
                   <a:srgbClr val="FFFFFF"/>
                 </a:solidFill>
@@ -235,7 +235,7 @@
             </a:ln>
             <a:extLst>
               <a:ext uri="{91240B29-F687-4f45-9708-019B960494DF}">
-                <a14:hiddenLine xmlns:a14="http://schemas.microsoft.com/office/drawing/2010/main" xmlns="" w="9525">
+                <a14:hiddenLine xmlns="" xmlns:a14="http://schemas.microsoft.com/office/drawing/2010/main" w="9525">
                   <a:solidFill>
                     <a:srgbClr val="000000"/>
                   </a:solidFill>
@@ -325,7 +325,7 @@
             </a:ln>
             <a:extLst>
               <a:ext uri="{91240B29-F687-4f45-9708-019B960494DF}">
-                <a14:hiddenLine xmlns:a14="http://schemas.microsoft.com/office/drawing/2010/main" xmlns="" w="9525">
+                <a14:hiddenLine xmlns="" xmlns:a14="http://schemas.microsoft.com/office/drawing/2010/main" w="9525">
                   <a:solidFill>
                     <a:srgbClr val="000000"/>
                   </a:solidFill>
@@ -415,7 +415,7 @@
             </a:ln>
             <a:extLst>
               <a:ext uri="{91240B29-F687-4f45-9708-019B960494DF}">
-                <a14:hiddenLine xmlns:a14="http://schemas.microsoft.com/office/drawing/2010/main" xmlns="" w="9525">
+                <a14:hiddenLine xmlns="" xmlns:a14="http://schemas.microsoft.com/office/drawing/2010/main" w="9525">
                   <a:solidFill>
                     <a:srgbClr val="000000"/>
                   </a:solidFill>
@@ -449,7 +449,7 @@
             </a:ln>
             <a:extLst>
               <a:ext uri="{91240B29-F687-4f45-9708-019B960494DF}">
-                <a14:hiddenLine xmlns:a14="http://schemas.microsoft.com/office/drawing/2010/main" xmlns="" w="9525">
+                <a14:hiddenLine xmlns="" xmlns:a14="http://schemas.microsoft.com/office/drawing/2010/main" w="9525">
                   <a:solidFill>
                     <a:srgbClr val="000000"/>
                   </a:solidFill>
@@ -539,7 +539,7 @@
             </a:ln>
             <a:extLst>
               <a:ext uri="{91240B29-F687-4f45-9708-019B960494DF}">
-                <a14:hiddenLine xmlns:a14="http://schemas.microsoft.com/office/drawing/2010/main" xmlns="" w="9525">
+                <a14:hiddenLine xmlns="" xmlns:a14="http://schemas.microsoft.com/office/drawing/2010/main" w="9525">
                   <a:solidFill>
                     <a:srgbClr val="000000"/>
                   </a:solidFill>
@@ -601,7 +601,7 @@
             </a:ln>
             <a:extLst>
               <a:ext uri="{91240B29-F687-4f45-9708-019B960494DF}">
-                <a14:hiddenLine xmlns:a14="http://schemas.microsoft.com/office/drawing/2010/main" xmlns="" w="9525">
+                <a14:hiddenLine xmlns="" xmlns:a14="http://schemas.microsoft.com/office/drawing/2010/main" w="9525">
                   <a:solidFill>
                     <a:srgbClr val="000000"/>
                   </a:solidFill>
@@ -663,7 +663,7 @@
             </a:ln>
             <a:extLst>
               <a:ext uri="{91240B29-F687-4f45-9708-019B960494DF}">
-                <a14:hiddenLine xmlns:a14="http://schemas.microsoft.com/office/drawing/2010/main" xmlns="" w="9525">
+                <a14:hiddenLine xmlns="" xmlns:a14="http://schemas.microsoft.com/office/drawing/2010/main" w="9525">
                   <a:solidFill>
                     <a:srgbClr val="000000"/>
                   </a:solidFill>
@@ -753,7 +753,7 @@
             </a:ln>
             <a:extLst>
               <a:ext uri="{91240B29-F687-4f45-9708-019B960494DF}">
-                <a14:hiddenLine xmlns:a14="http://schemas.microsoft.com/office/drawing/2010/main" xmlns="" w="9525">
+                <a14:hiddenLine xmlns="" xmlns:a14="http://schemas.microsoft.com/office/drawing/2010/main" w="9525">
                   <a:solidFill>
                     <a:srgbClr val="000000"/>
                   </a:solidFill>
@@ -815,7 +815,7 @@
             </a:ln>
             <a:extLst>
               <a:ext uri="{91240B29-F687-4f45-9708-019B960494DF}">
-                <a14:hiddenLine xmlns:a14="http://schemas.microsoft.com/office/drawing/2010/main" xmlns="" w="9525">
+                <a14:hiddenLine xmlns="" xmlns:a14="http://schemas.microsoft.com/office/drawing/2010/main" w="9525">
                   <a:solidFill>
                     <a:srgbClr val="000000"/>
                   </a:solidFill>
@@ -877,7 +877,7 @@
             </a:ln>
             <a:extLst>
               <a:ext uri="{91240B29-F687-4f45-9708-019B960494DF}">
-                <a14:hiddenLine xmlns:a14="http://schemas.microsoft.com/office/drawing/2010/main" xmlns="" w="9525">
+                <a14:hiddenLine xmlns="" xmlns:a14="http://schemas.microsoft.com/office/drawing/2010/main" w="9525">
                   <a:solidFill>
                     <a:srgbClr val="000000"/>
                   </a:solidFill>
@@ -967,7 +967,7 @@
             </a:ln>
             <a:extLst>
               <a:ext uri="{91240B29-F687-4f45-9708-019B960494DF}">
-                <a14:hiddenLine xmlns:a14="http://schemas.microsoft.com/office/drawing/2010/main" xmlns="" w="9525">
+                <a14:hiddenLine xmlns="" xmlns:a14="http://schemas.microsoft.com/office/drawing/2010/main" w="9525">
                   <a:solidFill>
                     <a:srgbClr val="000000"/>
                   </a:solidFill>
@@ -1057,7 +1057,7 @@
             </a:ln>
             <a:extLst>
               <a:ext uri="{91240B29-F687-4f45-9708-019B960494DF}">
-                <a14:hiddenLine xmlns:a14="http://schemas.microsoft.com/office/drawing/2010/main" xmlns="" w="9525">
+                <a14:hiddenLine xmlns="" xmlns:a14="http://schemas.microsoft.com/office/drawing/2010/main" w="9525">
                   <a:solidFill>
                     <a:srgbClr val="000000"/>
                   </a:solidFill>
@@ -1119,7 +1119,7 @@
             </a:ln>
             <a:extLst>
               <a:ext uri="{91240B29-F687-4f45-9708-019B960494DF}">
-                <a14:hiddenLine xmlns:a14="http://schemas.microsoft.com/office/drawing/2010/main" xmlns="" w="9525">
+                <a14:hiddenLine xmlns="" xmlns:a14="http://schemas.microsoft.com/office/drawing/2010/main" w="9525">
                   <a:solidFill>
                     <a:srgbClr val="000000"/>
                   </a:solidFill>
@@ -1229,7 +1229,7 @@
             </a:ln>
             <a:extLst>
               <a:ext uri="{91240B29-F687-4f45-9708-019B960494DF}">
-                <a14:hiddenLine xmlns:a14="http://schemas.microsoft.com/office/drawing/2010/main" xmlns="" w="9525">
+                <a14:hiddenLine xmlns="" xmlns:a14="http://schemas.microsoft.com/office/drawing/2010/main" w="9525">
                   <a:solidFill>
                     <a:srgbClr val="000000"/>
                   </a:solidFill>
@@ -1291,7 +1291,7 @@
             </a:ln>
             <a:extLst>
               <a:ext uri="{91240B29-F687-4f45-9708-019B960494DF}">
-                <a14:hiddenLine xmlns:a14="http://schemas.microsoft.com/office/drawing/2010/main" xmlns="" w="9525">
+                <a14:hiddenLine xmlns="" xmlns:a14="http://schemas.microsoft.com/office/drawing/2010/main" w="9525">
                   <a:solidFill>
                     <a:srgbClr val="000000"/>
                   </a:solidFill>
@@ -1381,7 +1381,7 @@
             </a:ln>
             <a:extLst>
               <a:ext uri="{91240B29-F687-4f45-9708-019B960494DF}">
-                <a14:hiddenLine xmlns:a14="http://schemas.microsoft.com/office/drawing/2010/main" xmlns="" w="9525">
+                <a14:hiddenLine xmlns="" xmlns:a14="http://schemas.microsoft.com/office/drawing/2010/main" w="9525">
                   <a:solidFill>
                     <a:srgbClr val="000000"/>
                   </a:solidFill>
@@ -1471,7 +1471,7 @@
             </a:ln>
             <a:extLst>
               <a:ext uri="{91240B29-F687-4f45-9708-019B960494DF}">
-                <a14:hiddenLine xmlns:a14="http://schemas.microsoft.com/office/drawing/2010/main" xmlns="" w="9525">
+                <a14:hiddenLine xmlns="" xmlns:a14="http://schemas.microsoft.com/office/drawing/2010/main" w="9525">
                   <a:solidFill>
                     <a:srgbClr val="000000"/>
                   </a:solidFill>
@@ -1533,7 +1533,7 @@
             </a:ln>
             <a:extLst>
               <a:ext uri="{91240B29-F687-4f45-9708-019B960494DF}">
-                <a14:hiddenLine xmlns:a14="http://schemas.microsoft.com/office/drawing/2010/main" xmlns="" w="9525">
+                <a14:hiddenLine xmlns="" xmlns:a14="http://schemas.microsoft.com/office/drawing/2010/main" w="9525">
                   <a:solidFill>
                     <a:srgbClr val="000000"/>
                   </a:solidFill>
@@ -1623,7 +1623,7 @@
             </a:ln>
             <a:extLst>
               <a:ext uri="{91240B29-F687-4f45-9708-019B960494DF}">
-                <a14:hiddenLine xmlns:a14="http://schemas.microsoft.com/office/drawing/2010/main" xmlns="" w="9525">
+                <a14:hiddenLine xmlns="" xmlns:a14="http://schemas.microsoft.com/office/drawing/2010/main" w="9525">
                   <a:solidFill>
                     <a:srgbClr val="000000"/>
                   </a:solidFill>
@@ -1713,7 +1713,7 @@
             </a:ln>
             <a:extLst>
               <a:ext uri="{91240B29-F687-4f45-9708-019B960494DF}">
-                <a14:hiddenLine xmlns:a14="http://schemas.microsoft.com/office/drawing/2010/main" xmlns="" w="9525">
+                <a14:hiddenLine xmlns="" xmlns:a14="http://schemas.microsoft.com/office/drawing/2010/main" w="9525">
                   <a:solidFill>
                     <a:srgbClr val="000000"/>
                   </a:solidFill>
@@ -1769,7 +1769,7 @@
             </a:ln>
             <a:extLst>
               <a:ext uri="{91240B29-F687-4f45-9708-019B960494DF}">
-                <a14:hiddenLine xmlns:a14="http://schemas.microsoft.com/office/drawing/2010/main" xmlns="" w="9525">
+                <a14:hiddenLine xmlns="" xmlns:a14="http://schemas.microsoft.com/office/drawing/2010/main" w="9525">
                   <a:solidFill>
                     <a:srgbClr val="000000"/>
                   </a:solidFill>
@@ -1859,7 +1859,7 @@
             </a:ln>
             <a:extLst>
               <a:ext uri="{91240B29-F687-4f45-9708-019B960494DF}">
-                <a14:hiddenLine xmlns:a14="http://schemas.microsoft.com/office/drawing/2010/main" xmlns="" w="9525">
+                <a14:hiddenLine xmlns="" xmlns:a14="http://schemas.microsoft.com/office/drawing/2010/main" w="9525">
                   <a:solidFill>
                     <a:srgbClr val="000000"/>
                   </a:solidFill>
@@ -1915,7 +1915,7 @@
             </a:ln>
             <a:extLst>
               <a:ext uri="{91240B29-F687-4f45-9708-019B960494DF}">
-                <a14:hiddenLine xmlns:a14="http://schemas.microsoft.com/office/drawing/2010/main" xmlns="" w="9525">
+                <a14:hiddenLine xmlns="" xmlns:a14="http://schemas.microsoft.com/office/drawing/2010/main" w="9525">
                   <a:solidFill>
                     <a:srgbClr val="000000"/>
                   </a:solidFill>
@@ -2005,7 +2005,7 @@
             </a:ln>
             <a:extLst>
               <a:ext uri="{91240B29-F687-4f45-9708-019B960494DF}">
-                <a14:hiddenLine xmlns:a14="http://schemas.microsoft.com/office/drawing/2010/main" xmlns="" w="9525">
+                <a14:hiddenLine xmlns="" xmlns:a14="http://schemas.microsoft.com/office/drawing/2010/main" w="9525">
                   <a:solidFill>
                     <a:srgbClr val="000000"/>
                   </a:solidFill>
@@ -2073,7 +2073,7 @@
             </a:ln>
             <a:extLst>
               <a:ext uri="{91240B29-F687-4f45-9708-019B960494DF}">
-                <a14:hiddenLine xmlns:a14="http://schemas.microsoft.com/office/drawing/2010/main" xmlns="" w="9525">
+                <a14:hiddenLine xmlns="" xmlns:a14="http://schemas.microsoft.com/office/drawing/2010/main" w="9525">
                   <a:solidFill>
                     <a:srgbClr val="000000"/>
                   </a:solidFill>
@@ -2163,7 +2163,7 @@
             </a:ln>
             <a:extLst>
               <a:ext uri="{91240B29-F687-4f45-9708-019B960494DF}">
-                <a14:hiddenLine xmlns:a14="http://schemas.microsoft.com/office/drawing/2010/main" xmlns="" w="9525">
+                <a14:hiddenLine xmlns="" xmlns:a14="http://schemas.microsoft.com/office/drawing/2010/main" w="9525">
                   <a:solidFill>
                     <a:srgbClr val="000000"/>
                   </a:solidFill>
@@ -2231,7 +2231,7 @@
             </a:ln>
             <a:extLst>
               <a:ext uri="{91240B29-F687-4f45-9708-019B960494DF}">
-                <a14:hiddenLine xmlns:a14="http://schemas.microsoft.com/office/drawing/2010/main" xmlns="" w="9525">
+                <a14:hiddenLine xmlns="" xmlns:a14="http://schemas.microsoft.com/office/drawing/2010/main" w="9525">
                   <a:solidFill>
                     <a:srgbClr val="000000"/>
                   </a:solidFill>
@@ -2321,7 +2321,7 @@
             </a:ln>
             <a:extLst>
               <a:ext uri="{91240B29-F687-4f45-9708-019B960494DF}">
-                <a14:hiddenLine xmlns:a14="http://schemas.microsoft.com/office/drawing/2010/main" xmlns="" w="9525">
+                <a14:hiddenLine xmlns="" xmlns:a14="http://schemas.microsoft.com/office/drawing/2010/main" w="9525">
                   <a:solidFill>
                     <a:srgbClr val="000000"/>
                   </a:solidFill>
@@ -2355,7 +2355,7 @@
             </a:ln>
             <a:extLst>
               <a:ext uri="{91240B29-F687-4f45-9708-019B960494DF}">
-                <a14:hiddenLine xmlns:a14="http://schemas.microsoft.com/office/drawing/2010/main" xmlns="" w="9525">
+                <a14:hiddenLine xmlns="" xmlns:a14="http://schemas.microsoft.com/office/drawing/2010/main" w="9525">
                   <a:solidFill>
                     <a:srgbClr val="000000"/>
                   </a:solidFill>
@@ -2445,7 +2445,7 @@
             </a:ln>
             <a:extLst>
               <a:ext uri="{91240B29-F687-4f45-9708-019B960494DF}">
-                <a14:hiddenLine xmlns:a14="http://schemas.microsoft.com/office/drawing/2010/main" xmlns="" w="9525">
+                <a14:hiddenLine xmlns="" xmlns:a14="http://schemas.microsoft.com/office/drawing/2010/main" w="9525">
                   <a:solidFill>
                     <a:srgbClr val="000000"/>
                   </a:solidFill>
@@ -2507,7 +2507,7 @@
             </a:ln>
             <a:extLst>
               <a:ext uri="{91240B29-F687-4f45-9708-019B960494DF}">
-                <a14:hiddenLine xmlns:a14="http://schemas.microsoft.com/office/drawing/2010/main" xmlns="" w="9525">
+                <a14:hiddenLine xmlns="" xmlns:a14="http://schemas.microsoft.com/office/drawing/2010/main" w="9525">
                   <a:solidFill>
                     <a:srgbClr val="000000"/>
                   </a:solidFill>
@@ -2569,7 +2569,7 @@
             </a:ln>
             <a:extLst>
               <a:ext uri="{91240B29-F687-4f45-9708-019B960494DF}">
-                <a14:hiddenLine xmlns:a14="http://schemas.microsoft.com/office/drawing/2010/main" xmlns="" w="9525">
+                <a14:hiddenLine xmlns="" xmlns:a14="http://schemas.microsoft.com/office/drawing/2010/main" w="9525">
                   <a:solidFill>
                     <a:srgbClr val="000000"/>
                   </a:solidFill>
@@ -2659,7 +2659,7 @@
             </a:ln>
             <a:extLst>
               <a:ext uri="{91240B29-F687-4f45-9708-019B960494DF}">
-                <a14:hiddenLine xmlns:a14="http://schemas.microsoft.com/office/drawing/2010/main" xmlns="" w="9525">
+                <a14:hiddenLine xmlns="" xmlns:a14="http://schemas.microsoft.com/office/drawing/2010/main" w="9525">
                   <a:solidFill>
                     <a:srgbClr val="000000"/>
                   </a:solidFill>
@@ -2727,7 +2727,7 @@
             </a:ln>
             <a:extLst>
               <a:ext uri="{91240B29-F687-4f45-9708-019B960494DF}">
-                <a14:hiddenLine xmlns:a14="http://schemas.microsoft.com/office/drawing/2010/main" xmlns="" w="9525">
+                <a14:hiddenLine xmlns="" xmlns:a14="http://schemas.microsoft.com/office/drawing/2010/main" w="9525">
                   <a:solidFill>
                     <a:srgbClr val="000000"/>
                   </a:solidFill>
@@ -2789,7 +2789,7 @@
             </a:ln>
             <a:extLst>
               <a:ext uri="{91240B29-F687-4f45-9708-019B960494DF}">
-                <a14:hiddenLine xmlns:a14="http://schemas.microsoft.com/office/drawing/2010/main" xmlns="" w="9525">
+                <a14:hiddenLine xmlns="" xmlns:a14="http://schemas.microsoft.com/office/drawing/2010/main" w="9525">
                   <a:solidFill>
                     <a:srgbClr val="000000"/>
                   </a:solidFill>
@@ -2879,7 +2879,7 @@
             </a:ln>
             <a:extLst>
               <a:ext uri="{91240B29-F687-4f45-9708-019B960494DF}">
-                <a14:hiddenLine xmlns:a14="http://schemas.microsoft.com/office/drawing/2010/main" xmlns="" w="9525">
+                <a14:hiddenLine xmlns="" xmlns:a14="http://schemas.microsoft.com/office/drawing/2010/main" w="9525">
                   <a:solidFill>
                     <a:srgbClr val="000000"/>
                   </a:solidFill>
@@ -2941,7 +2941,7 @@
             </a:ln>
             <a:extLst>
               <a:ext uri="{91240B29-F687-4f45-9708-019B960494DF}">
-                <a14:hiddenLine xmlns:a14="http://schemas.microsoft.com/office/drawing/2010/main" xmlns="" w="9525">
+                <a14:hiddenLine xmlns="" xmlns:a14="http://schemas.microsoft.com/office/drawing/2010/main" w="9525">
                   <a:solidFill>
                     <a:srgbClr val="000000"/>
                   </a:solidFill>
@@ -3031,7 +3031,7 @@
             </a:ln>
             <a:extLst>
               <a:ext uri="{91240B29-F687-4f45-9708-019B960494DF}">
-                <a14:hiddenLine xmlns:a14="http://schemas.microsoft.com/office/drawing/2010/main" xmlns="" w="9525">
+                <a14:hiddenLine xmlns="" xmlns:a14="http://schemas.microsoft.com/office/drawing/2010/main" w="9525">
                   <a:solidFill>
                     <a:srgbClr val="000000"/>
                   </a:solidFill>
@@ -3093,7 +3093,7 @@
             </a:ln>
             <a:extLst>
               <a:ext uri="{91240B29-F687-4f45-9708-019B960494DF}">
-                <a14:hiddenLine xmlns:a14="http://schemas.microsoft.com/office/drawing/2010/main" xmlns="" w="9525">
+                <a14:hiddenLine xmlns="" xmlns:a14="http://schemas.microsoft.com/office/drawing/2010/main" w="9525">
                   <a:solidFill>
                     <a:srgbClr val="000000"/>
                   </a:solidFill>
@@ -3183,7 +3183,7 @@
             </a:ln>
             <a:extLst>
               <a:ext uri="{91240B29-F687-4f45-9708-019B960494DF}">
-                <a14:hiddenLine xmlns:a14="http://schemas.microsoft.com/office/drawing/2010/main" xmlns="" w="9525">
+                <a14:hiddenLine xmlns="" xmlns:a14="http://schemas.microsoft.com/office/drawing/2010/main" w="9525">
                   <a:solidFill>
                     <a:srgbClr val="000000"/>
                   </a:solidFill>
@@ -3217,7 +3217,7 @@
             </a:ln>
             <a:extLst>
               <a:ext uri="{91240B29-F687-4f45-9708-019B960494DF}">
-                <a14:hiddenLine xmlns:a14="http://schemas.microsoft.com/office/drawing/2010/main" xmlns="" w="9525">
+                <a14:hiddenLine xmlns="" xmlns:a14="http://schemas.microsoft.com/office/drawing/2010/main" w="9525">
                   <a:solidFill>
                     <a:srgbClr val="000000"/>
                   </a:solidFill>
@@ -3282,7 +3282,7 @@
             </a:ln>
             <a:extLst>
               <a:ext uri="{91240B29-F687-4f45-9708-019B960494DF}">
-                <a14:hiddenLine xmlns:a14="http://schemas.microsoft.com/office/drawing/2010/main" xmlns="" w="9525">
+                <a14:hiddenLine xmlns="" xmlns:a14="http://schemas.microsoft.com/office/drawing/2010/main" w="9525">
                   <a:solidFill>
                     <a:srgbClr val="000000"/>
                   </a:solidFill>
@@ -3372,7 +3372,7 @@
             </a:ln>
             <a:extLst>
               <a:ext uri="{91240B29-F687-4f45-9708-019B960494DF}">
-                <a14:hiddenLine xmlns:a14="http://schemas.microsoft.com/office/drawing/2010/main" xmlns="" w="9525">
+                <a14:hiddenLine xmlns="" xmlns:a14="http://schemas.microsoft.com/office/drawing/2010/main" w="9525">
                   <a:solidFill>
                     <a:srgbClr val="000000"/>
                   </a:solidFill>
@@ -3434,7 +3434,7 @@
             </a:ln>
             <a:extLst>
               <a:ext uri="{91240B29-F687-4f45-9708-019B960494DF}">
-                <a14:hiddenLine xmlns:a14="http://schemas.microsoft.com/office/drawing/2010/main" xmlns="" w="9525">
+                <a14:hiddenLine xmlns="" xmlns:a14="http://schemas.microsoft.com/office/drawing/2010/main" w="9525">
                   <a:solidFill>
                     <a:srgbClr val="000000"/>
                   </a:solidFill>
@@ -3524,7 +3524,7 @@
             </a:ln>
             <a:extLst>
               <a:ext uri="{91240B29-F687-4f45-9708-019B960494DF}">
-                <a14:hiddenLine xmlns:a14="http://schemas.microsoft.com/office/drawing/2010/main" xmlns="" w="9525">
+                <a14:hiddenLine xmlns="" xmlns:a14="http://schemas.microsoft.com/office/drawing/2010/main" w="9525">
                   <a:solidFill>
                     <a:srgbClr val="000000"/>
                   </a:solidFill>
@@ -3614,7 +3614,7 @@
             </a:ln>
             <a:extLst>
               <a:ext uri="{91240B29-F687-4f45-9708-019B960494DF}">
-                <a14:hiddenLine xmlns:a14="http://schemas.microsoft.com/office/drawing/2010/main" xmlns="" w="9525">
+                <a14:hiddenLine xmlns="" xmlns:a14="http://schemas.microsoft.com/office/drawing/2010/main" w="9525">
                   <a:solidFill>
                     <a:srgbClr val="000000"/>
                   </a:solidFill>
@@ -3679,7 +3679,7 @@
             </a:ln>
             <a:extLst>
               <a:ext uri="{91240B29-F687-4f45-9708-019B960494DF}">
-                <a14:hiddenLine xmlns:a14="http://schemas.microsoft.com/office/drawing/2010/main" xmlns="" w="9525">
+                <a14:hiddenLine xmlns="" xmlns:a14="http://schemas.microsoft.com/office/drawing/2010/main" w="9525">
                   <a:solidFill>
                     <a:srgbClr val="000000"/>
                   </a:solidFill>
@@ -3741,7 +3741,7 @@
             </a:ln>
             <a:extLst>
               <a:ext uri="{91240B29-F687-4f45-9708-019B960494DF}">
-                <a14:hiddenLine xmlns:a14="http://schemas.microsoft.com/office/drawing/2010/main" xmlns="" w="9525">
+                <a14:hiddenLine xmlns="" xmlns:a14="http://schemas.microsoft.com/office/drawing/2010/main" w="9525">
                   <a:solidFill>
                     <a:srgbClr val="000000"/>
                   </a:solidFill>
@@ -3831,7 +3831,7 @@
             </a:ln>
             <a:extLst>
               <a:ext uri="{91240B29-F687-4f45-9708-019B960494DF}">
-                <a14:hiddenLine xmlns:a14="http://schemas.microsoft.com/office/drawing/2010/main" xmlns="" w="9525">
+                <a14:hiddenLine xmlns="" xmlns:a14="http://schemas.microsoft.com/office/drawing/2010/main" w="9525">
                   <a:solidFill>
                     <a:srgbClr val="000000"/>
                   </a:solidFill>
@@ -3921,7 +3921,7 @@
             </a:ln>
             <a:extLst>
               <a:ext uri="{91240B29-F687-4f45-9708-019B960494DF}">
-                <a14:hiddenLine xmlns:a14="http://schemas.microsoft.com/office/drawing/2010/main" xmlns="" w="9525">
+                <a14:hiddenLine xmlns="" xmlns:a14="http://schemas.microsoft.com/office/drawing/2010/main" w="9525">
                   <a:solidFill>
                     <a:srgbClr val="000000"/>
                   </a:solidFill>
@@ -3983,7 +3983,7 @@
             </a:ln>
             <a:extLst>
               <a:ext uri="{91240B29-F687-4f45-9708-019B960494DF}">
-                <a14:hiddenLine xmlns:a14="http://schemas.microsoft.com/office/drawing/2010/main" xmlns="" w="9525">
+                <a14:hiddenLine xmlns="" xmlns:a14="http://schemas.microsoft.com/office/drawing/2010/main" w="9525">
                   <a:solidFill>
                     <a:srgbClr val="000000"/>
                   </a:solidFill>
@@ -4103,7 +4103,7 @@
             </a:ln>
             <a:extLst>
               <a:ext uri="{91240B29-F687-4f45-9708-019B960494DF}">
-                <a14:hiddenLine xmlns:a14="http://schemas.microsoft.com/office/drawing/2010/main" xmlns="" w="9525">
+                <a14:hiddenLine xmlns="" xmlns:a14="http://schemas.microsoft.com/office/drawing/2010/main" w="9525">
                   <a:solidFill>
                     <a:srgbClr val="000000"/>
                   </a:solidFill>
@@ -4171,7 +4171,7 @@
             </a:ln>
             <a:extLst>
               <a:ext uri="{91240B29-F687-4f45-9708-019B960494DF}">
-                <a14:hiddenLine xmlns:a14="http://schemas.microsoft.com/office/drawing/2010/main" xmlns="" w="9525">
+                <a14:hiddenLine xmlns="" xmlns:a14="http://schemas.microsoft.com/office/drawing/2010/main" w="9525">
                   <a:solidFill>
                     <a:srgbClr val="000000"/>
                   </a:solidFill>
@@ -4261,7 +4261,7 @@
             </a:ln>
             <a:extLst>
               <a:ext uri="{91240B29-F687-4f45-9708-019B960494DF}">
-                <a14:hiddenLine xmlns:a14="http://schemas.microsoft.com/office/drawing/2010/main" xmlns="" w="9525">
+                <a14:hiddenLine xmlns="" xmlns:a14="http://schemas.microsoft.com/office/drawing/2010/main" w="9525">
                   <a:solidFill>
                     <a:srgbClr val="000000"/>
                   </a:solidFill>
@@ -9075,7 +9075,7 @@
           <a:noFill/>
           <a:extLst>
             <a:ext uri="{909E8E84-426E-40dd-AFC4-6F175D3DCCD1}">
-              <a14:hiddenFill xmlns:a14="http://schemas.microsoft.com/office/drawing/2010/main" xmlns="">
+              <a14:hiddenFill xmlns="" xmlns:a14="http://schemas.microsoft.com/office/drawing/2010/main">
                 <a:solidFill>
                   <a:srgbClr val="FFFFFF"/>
                 </a:solidFill>
@@ -9149,7 +9149,7 @@
               </a:ln>
               <a:extLst>
                 <a:ext uri="{91240B29-F687-4f45-9708-019B960494DF}">
-                  <a14:hiddenLine xmlns:a14="http://schemas.microsoft.com/office/drawing/2010/main" xmlns="" w="9525">
+                  <a14:hiddenLine xmlns="" xmlns:a14="http://schemas.microsoft.com/office/drawing/2010/main" w="9525">
                     <a:solidFill>
                       <a:srgbClr val="000000"/>
                     </a:solidFill>
@@ -9239,7 +9239,7 @@
               </a:ln>
               <a:extLst>
                 <a:ext uri="{91240B29-F687-4f45-9708-019B960494DF}">
-                  <a14:hiddenLine xmlns:a14="http://schemas.microsoft.com/office/drawing/2010/main" xmlns="" w="9525">
+                  <a14:hiddenLine xmlns="" xmlns:a14="http://schemas.microsoft.com/office/drawing/2010/main" w="9525">
                     <a:solidFill>
                       <a:srgbClr val="000000"/>
                     </a:solidFill>
@@ -9329,7 +9329,7 @@
               </a:ln>
               <a:extLst>
                 <a:ext uri="{91240B29-F687-4f45-9708-019B960494DF}">
-                  <a14:hiddenLine xmlns:a14="http://schemas.microsoft.com/office/drawing/2010/main" xmlns="" w="9525">
+                  <a14:hiddenLine xmlns="" xmlns:a14="http://schemas.microsoft.com/office/drawing/2010/main" w="9525">
                     <a:solidFill>
                       <a:srgbClr val="000000"/>
                     </a:solidFill>
@@ -9391,7 +9391,7 @@
               </a:ln>
               <a:extLst>
                 <a:ext uri="{91240B29-F687-4f45-9708-019B960494DF}">
-                  <a14:hiddenLine xmlns:a14="http://schemas.microsoft.com/office/drawing/2010/main" xmlns="" w="9525">
+                  <a14:hiddenLine xmlns="" xmlns:a14="http://schemas.microsoft.com/office/drawing/2010/main" w="9525">
                     <a:solidFill>
                       <a:srgbClr val="000000"/>
                     </a:solidFill>
@@ -9481,7 +9481,7 @@
               </a:ln>
               <a:extLst>
                 <a:ext uri="{91240B29-F687-4f45-9708-019B960494DF}">
-                  <a14:hiddenLine xmlns:a14="http://schemas.microsoft.com/office/drawing/2010/main" xmlns="" w="9525">
+                  <a14:hiddenLine xmlns="" xmlns:a14="http://schemas.microsoft.com/office/drawing/2010/main" w="9525">
                     <a:solidFill>
                       <a:srgbClr val="000000"/>
                     </a:solidFill>
@@ -9543,7 +9543,7 @@
               </a:ln>
               <a:extLst>
                 <a:ext uri="{91240B29-F687-4f45-9708-019B960494DF}">
-                  <a14:hiddenLine xmlns:a14="http://schemas.microsoft.com/office/drawing/2010/main" xmlns="" w="9525">
+                  <a14:hiddenLine xmlns="" xmlns:a14="http://schemas.microsoft.com/office/drawing/2010/main" w="9525">
                     <a:solidFill>
                       <a:srgbClr val="000000"/>
                     </a:solidFill>
@@ -9605,7 +9605,7 @@
               </a:ln>
               <a:extLst>
                 <a:ext uri="{91240B29-F687-4f45-9708-019B960494DF}">
-                  <a14:hiddenLine xmlns:a14="http://schemas.microsoft.com/office/drawing/2010/main" xmlns="" w="9525">
+                  <a14:hiddenLine xmlns="" xmlns:a14="http://schemas.microsoft.com/office/drawing/2010/main" w="9525">
                     <a:solidFill>
                       <a:srgbClr val="000000"/>
                     </a:solidFill>
@@ -9695,7 +9695,7 @@
               </a:ln>
               <a:extLst>
                 <a:ext uri="{91240B29-F687-4f45-9708-019B960494DF}">
-                  <a14:hiddenLine xmlns:a14="http://schemas.microsoft.com/office/drawing/2010/main" xmlns="" w="9525">
+                  <a14:hiddenLine xmlns="" xmlns:a14="http://schemas.microsoft.com/office/drawing/2010/main" w="9525">
                     <a:solidFill>
                       <a:srgbClr val="000000"/>
                     </a:solidFill>
@@ -9785,7 +9785,7 @@
               </a:ln>
               <a:extLst>
                 <a:ext uri="{91240B29-F687-4f45-9708-019B960494DF}">
-                  <a14:hiddenLine xmlns:a14="http://schemas.microsoft.com/office/drawing/2010/main" xmlns="" w="9525">
+                  <a14:hiddenLine xmlns="" xmlns:a14="http://schemas.microsoft.com/office/drawing/2010/main" w="9525">
                     <a:solidFill>
                       <a:srgbClr val="000000"/>
                     </a:solidFill>
@@ -9847,7 +9847,7 @@
               </a:ln>
               <a:extLst>
                 <a:ext uri="{91240B29-F687-4f45-9708-019B960494DF}">
-                  <a14:hiddenLine xmlns:a14="http://schemas.microsoft.com/office/drawing/2010/main" xmlns="" w="9525">
+                  <a14:hiddenLine xmlns="" xmlns:a14="http://schemas.microsoft.com/office/drawing/2010/main" w="9525">
                     <a:solidFill>
                       <a:srgbClr val="000000"/>
                     </a:solidFill>
@@ -9957,7 +9957,7 @@
               </a:ln>
               <a:extLst>
                 <a:ext uri="{91240B29-F687-4f45-9708-019B960494DF}">
-                  <a14:hiddenLine xmlns:a14="http://schemas.microsoft.com/office/drawing/2010/main" xmlns="" w="9525">
+                  <a14:hiddenLine xmlns="" xmlns:a14="http://schemas.microsoft.com/office/drawing/2010/main" w="9525">
                     <a:solidFill>
                       <a:srgbClr val="000000"/>
                     </a:solidFill>
@@ -10041,7 +10041,7 @@
               </a:ln>
               <a:extLst>
                 <a:ext uri="{91240B29-F687-4f45-9708-019B960494DF}">
-                  <a14:hiddenLine xmlns:a14="http://schemas.microsoft.com/office/drawing/2010/main" xmlns="" w="9525">
+                  <a14:hiddenLine xmlns="" xmlns:a14="http://schemas.microsoft.com/office/drawing/2010/main" w="9525">
                     <a:solidFill>
                       <a:srgbClr val="000000"/>
                     </a:solidFill>
@@ -10103,7 +10103,7 @@
               </a:ln>
               <a:extLst>
                 <a:ext uri="{91240B29-F687-4f45-9708-019B960494DF}">
-                  <a14:hiddenLine xmlns:a14="http://schemas.microsoft.com/office/drawing/2010/main" xmlns="" w="9525">
+                  <a14:hiddenLine xmlns="" xmlns:a14="http://schemas.microsoft.com/office/drawing/2010/main" w="9525">
                     <a:solidFill>
                       <a:srgbClr val="000000"/>
                     </a:solidFill>
@@ -10165,7 +10165,7 @@
               </a:ln>
               <a:extLst>
                 <a:ext uri="{91240B29-F687-4f45-9708-019B960494DF}">
-                  <a14:hiddenLine xmlns:a14="http://schemas.microsoft.com/office/drawing/2010/main" xmlns="" w="9525">
+                  <a14:hiddenLine xmlns="" xmlns:a14="http://schemas.microsoft.com/office/drawing/2010/main" w="9525">
                     <a:solidFill>
                       <a:srgbClr val="000000"/>
                     </a:solidFill>
@@ -10255,7 +10255,7 @@
               </a:ln>
               <a:extLst>
                 <a:ext uri="{91240B29-F687-4f45-9708-019B960494DF}">
-                  <a14:hiddenLine xmlns:a14="http://schemas.microsoft.com/office/drawing/2010/main" xmlns="" w="9525">
+                  <a14:hiddenLine xmlns="" xmlns:a14="http://schemas.microsoft.com/office/drawing/2010/main" w="9525">
                     <a:solidFill>
                       <a:srgbClr val="000000"/>
                     </a:solidFill>
@@ -10289,7 +10289,7 @@
               </a:ln>
               <a:extLst>
                 <a:ext uri="{91240B29-F687-4f45-9708-019B960494DF}">
-                  <a14:hiddenLine xmlns:a14="http://schemas.microsoft.com/office/drawing/2010/main" xmlns="" w="9525">
+                  <a14:hiddenLine xmlns="" xmlns:a14="http://schemas.microsoft.com/office/drawing/2010/main" w="9525">
                     <a:solidFill>
                       <a:srgbClr val="000000"/>
                     </a:solidFill>
@@ -10354,7 +10354,7 @@
               </a:ln>
               <a:extLst>
                 <a:ext uri="{91240B29-F687-4f45-9708-019B960494DF}">
-                  <a14:hiddenLine xmlns:a14="http://schemas.microsoft.com/office/drawing/2010/main" xmlns="" w="9525">
+                  <a14:hiddenLine xmlns="" xmlns:a14="http://schemas.microsoft.com/office/drawing/2010/main" w="9525">
                     <a:solidFill>
                       <a:srgbClr val="000000"/>
                     </a:solidFill>
@@ -10444,7 +10444,7 @@
               </a:ln>
               <a:extLst>
                 <a:ext uri="{91240B29-F687-4f45-9708-019B960494DF}">
-                  <a14:hiddenLine xmlns:a14="http://schemas.microsoft.com/office/drawing/2010/main" xmlns="" w="9525">
+                  <a14:hiddenLine xmlns="" xmlns:a14="http://schemas.microsoft.com/office/drawing/2010/main" w="9525">
                     <a:solidFill>
                       <a:srgbClr val="000000"/>
                     </a:solidFill>
@@ -10506,7 +10506,7 @@
               </a:ln>
               <a:extLst>
                 <a:ext uri="{91240B29-F687-4f45-9708-019B960494DF}">
-                  <a14:hiddenLine xmlns:a14="http://schemas.microsoft.com/office/drawing/2010/main" xmlns="" w="9525">
+                  <a14:hiddenLine xmlns="" xmlns:a14="http://schemas.microsoft.com/office/drawing/2010/main" w="9525">
                     <a:solidFill>
                       <a:srgbClr val="000000"/>
                     </a:solidFill>
@@ -10596,7 +10596,7 @@
               </a:ln>
               <a:extLst>
                 <a:ext uri="{91240B29-F687-4f45-9708-019B960494DF}">
-                  <a14:hiddenLine xmlns:a14="http://schemas.microsoft.com/office/drawing/2010/main" xmlns="" w="9525">
+                  <a14:hiddenLine xmlns="" xmlns:a14="http://schemas.microsoft.com/office/drawing/2010/main" w="9525">
                     <a:solidFill>
                       <a:srgbClr val="000000"/>
                     </a:solidFill>
@@ -10661,7 +10661,7 @@
               </a:ln>
               <a:extLst>
                 <a:ext uri="{91240B29-F687-4f45-9708-019B960494DF}">
-                  <a14:hiddenLine xmlns:a14="http://schemas.microsoft.com/office/drawing/2010/main" xmlns="" w="9525">
+                  <a14:hiddenLine xmlns="" xmlns:a14="http://schemas.microsoft.com/office/drawing/2010/main" w="9525">
                     <a:solidFill>
                       <a:srgbClr val="000000"/>
                     </a:solidFill>
@@ -10723,7 +10723,7 @@
               </a:ln>
               <a:extLst>
                 <a:ext uri="{91240B29-F687-4f45-9708-019B960494DF}">
-                  <a14:hiddenLine xmlns:a14="http://schemas.microsoft.com/office/drawing/2010/main" xmlns="" w="9525">
+                  <a14:hiddenLine xmlns="" xmlns:a14="http://schemas.microsoft.com/office/drawing/2010/main" w="9525">
                     <a:solidFill>
                       <a:srgbClr val="000000"/>
                     </a:solidFill>
@@ -10813,7 +10813,7 @@
               </a:ln>
               <a:extLst>
                 <a:ext uri="{91240B29-F687-4f45-9708-019B960494DF}">
-                  <a14:hiddenLine xmlns:a14="http://schemas.microsoft.com/office/drawing/2010/main" xmlns="" w="9525">
+                  <a14:hiddenLine xmlns="" xmlns:a14="http://schemas.microsoft.com/office/drawing/2010/main" w="9525">
                     <a:solidFill>
                       <a:srgbClr val="000000"/>
                     </a:solidFill>
@@ -10903,7 +10903,7 @@
               </a:ln>
               <a:extLst>
                 <a:ext uri="{91240B29-F687-4f45-9708-019B960494DF}">
-                  <a14:hiddenLine xmlns:a14="http://schemas.microsoft.com/office/drawing/2010/main" xmlns="" w="9525">
+                  <a14:hiddenLine xmlns="" xmlns:a14="http://schemas.microsoft.com/office/drawing/2010/main" w="9525">
                     <a:solidFill>
                       <a:srgbClr val="000000"/>
                     </a:solidFill>
@@ -10968,7 +10968,7 @@
               </a:ln>
               <a:extLst>
                 <a:ext uri="{91240B29-F687-4f45-9708-019B960494DF}">
-                  <a14:hiddenLine xmlns:a14="http://schemas.microsoft.com/office/drawing/2010/main" xmlns="" w="9525">
+                  <a14:hiddenLine xmlns="" xmlns:a14="http://schemas.microsoft.com/office/drawing/2010/main" w="9525">
                     <a:solidFill>
                       <a:srgbClr val="000000"/>
                     </a:solidFill>
@@ -11088,7 +11088,7 @@
               </a:ln>
               <a:extLst>
                 <a:ext uri="{91240B29-F687-4f45-9708-019B960494DF}">
-                  <a14:hiddenLine xmlns:a14="http://schemas.microsoft.com/office/drawing/2010/main" xmlns="" w="9525">
+                  <a14:hiddenLine xmlns="" xmlns:a14="http://schemas.microsoft.com/office/drawing/2010/main" w="9525">
                     <a:solidFill>
                       <a:srgbClr val="000000"/>
                     </a:solidFill>
@@ -11169,7 +11169,7 @@
               </a:ln>
               <a:extLst>
                 <a:ext uri="{91240B29-F687-4f45-9708-019B960494DF}">
-                  <a14:hiddenLine xmlns:a14="http://schemas.microsoft.com/office/drawing/2010/main" xmlns="" w="9525">
+                  <a14:hiddenLine xmlns="" xmlns:a14="http://schemas.microsoft.com/office/drawing/2010/main" w="9525">
                     <a:solidFill>
                       <a:srgbClr val="000000"/>
                     </a:solidFill>
@@ -11284,7 +11284,7 @@
               </a:ln>
               <a:extLst>
                 <a:ext uri="{91240B29-F687-4f45-9708-019B960494DF}">
-                  <a14:hiddenLine xmlns:a14="http://schemas.microsoft.com/office/drawing/2010/main" xmlns="" w="9525">
+                  <a14:hiddenLine xmlns="" xmlns:a14="http://schemas.microsoft.com/office/drawing/2010/main" w="9525">
                     <a:solidFill>
                       <a:srgbClr val="000000"/>
                     </a:solidFill>
@@ -11374,7 +11374,7 @@
               </a:ln>
               <a:extLst>
                 <a:ext uri="{91240B29-F687-4f45-9708-019B960494DF}">
-                  <a14:hiddenLine xmlns:a14="http://schemas.microsoft.com/office/drawing/2010/main" xmlns="" w="9525">
+                  <a14:hiddenLine xmlns="" xmlns:a14="http://schemas.microsoft.com/office/drawing/2010/main" w="9525">
                     <a:solidFill>
                       <a:srgbClr val="000000"/>
                     </a:solidFill>
@@ -11439,7 +11439,7 @@
               </a:ln>
               <a:extLst>
                 <a:ext uri="{91240B29-F687-4f45-9708-019B960494DF}">
-                  <a14:hiddenLine xmlns:a14="http://schemas.microsoft.com/office/drawing/2010/main" xmlns="" w="9525">
+                  <a14:hiddenLine xmlns="" xmlns:a14="http://schemas.microsoft.com/office/drawing/2010/main" w="9525">
                     <a:solidFill>
                       <a:srgbClr val="000000"/>
                     </a:solidFill>
@@ -11529,7 +11529,7 @@
               </a:ln>
               <a:extLst>
                 <a:ext uri="{91240B29-F687-4f45-9708-019B960494DF}">
-                  <a14:hiddenLine xmlns:a14="http://schemas.microsoft.com/office/drawing/2010/main" xmlns="" w="9525">
+                  <a14:hiddenLine xmlns="" xmlns:a14="http://schemas.microsoft.com/office/drawing/2010/main" w="9525">
                     <a:solidFill>
                       <a:srgbClr val="000000"/>
                     </a:solidFill>
@@ -11597,7 +11597,7 @@
               </a:ln>
               <a:extLst>
                 <a:ext uri="{91240B29-F687-4f45-9708-019B960494DF}">
-                  <a14:hiddenLine xmlns:a14="http://schemas.microsoft.com/office/drawing/2010/main" xmlns="" w="9525">
+                  <a14:hiddenLine xmlns="" xmlns:a14="http://schemas.microsoft.com/office/drawing/2010/main" w="9525">
                     <a:solidFill>
                       <a:srgbClr val="000000"/>
                     </a:solidFill>
@@ -11687,7 +11687,7 @@
               </a:ln>
               <a:extLst>
                 <a:ext uri="{91240B29-F687-4f45-9708-019B960494DF}">
-                  <a14:hiddenLine xmlns:a14="http://schemas.microsoft.com/office/drawing/2010/main" xmlns="" w="9525">
+                  <a14:hiddenLine xmlns="" xmlns:a14="http://schemas.microsoft.com/office/drawing/2010/main" w="9525">
                     <a:solidFill>
                       <a:srgbClr val="000000"/>
                     </a:solidFill>
@@ -11755,7 +11755,7 @@
               </a:ln>
               <a:extLst>
                 <a:ext uri="{91240B29-F687-4f45-9708-019B960494DF}">
-                  <a14:hiddenLine xmlns:a14="http://schemas.microsoft.com/office/drawing/2010/main" xmlns="" w="9525">
+                  <a14:hiddenLine xmlns="" xmlns:a14="http://schemas.microsoft.com/office/drawing/2010/main" w="9525">
                     <a:solidFill>
                       <a:srgbClr val="000000"/>
                     </a:solidFill>
@@ -11845,7 +11845,7 @@
               </a:ln>
               <a:extLst>
                 <a:ext uri="{91240B29-F687-4f45-9708-019B960494DF}">
-                  <a14:hiddenLine xmlns:a14="http://schemas.microsoft.com/office/drawing/2010/main" xmlns="" w="9525">
+                  <a14:hiddenLine xmlns="" xmlns:a14="http://schemas.microsoft.com/office/drawing/2010/main" w="9525">
                     <a:solidFill>
                       <a:srgbClr val="000000"/>
                     </a:solidFill>
@@ -11879,7 +11879,7 @@
               </a:ln>
               <a:extLst>
                 <a:ext uri="{91240B29-F687-4f45-9708-019B960494DF}">
-                  <a14:hiddenLine xmlns:a14="http://schemas.microsoft.com/office/drawing/2010/main" xmlns="" w="9525">
+                  <a14:hiddenLine xmlns="" xmlns:a14="http://schemas.microsoft.com/office/drawing/2010/main" w="9525">
                     <a:solidFill>
                       <a:srgbClr val="000000"/>
                     </a:solidFill>
@@ -13529,12 +13529,14 @@
         </p:nvSpPr>
         <p:spPr/>
         <p:txBody>
-          <a:bodyPr/>
+          <a:bodyPr>
+            <a:normAutofit/>
+          </a:bodyPr>
           <a:lstStyle/>
           <a:p>
             <a:r>
               <a:rPr lang="fr-FR" dirty="0"/>
-              <a:t>P1 – </a:t>
+              <a:t>P1 – @10am </a:t>
             </a:r>
             <a:r>
               <a:rPr lang="fr-FR" dirty="0" err="1"/>
@@ -13554,9 +13556,12 @@
             </a:r>
           </a:p>
           <a:p>
+            <a:endParaRPr lang="fr-FR" dirty="0"/>
+          </a:p>
+          <a:p>
             <a:r>
               <a:rPr lang="fr-FR" dirty="0"/>
-              <a:t>P2 – @~12pm - </a:t>
+              <a:t>P2 – @2pm – </a:t>
             </a:r>
             <a:r>
               <a:rPr lang="fr-FR" dirty="0" err="1"/>
@@ -13588,74 +13593,32 @@
             </a:r>
             <a:r>
               <a:rPr lang="fr-FR" dirty="0"/>
-              <a:t> SQL and </a:t>
+              <a:t> SQL</a:t>
+            </a:r>
+          </a:p>
+          <a:p>
+            <a:endParaRPr lang="fr-FR" dirty="0"/>
+          </a:p>
+          <a:p>
+            <a:r>
+              <a:rPr lang="fr-FR" dirty="0"/>
+              <a:t>P3 – @5pm – </a:t>
             </a:r>
             <a:r>
               <a:rPr lang="fr-FR" dirty="0" err="1"/>
-              <a:t>finally</a:t>
+              <a:t>Splitting</a:t>
             </a:r>
             <a:r>
               <a:rPr lang="fr-FR" dirty="0"/>
-              <a:t> </a:t>
+              <a:t> the </a:t>
             </a:r>
             <a:r>
               <a:rPr lang="fr-FR" dirty="0" err="1"/>
-              <a:t>deciding</a:t>
+              <a:t>work</a:t>
             </a:r>
             <a:r>
               <a:rPr lang="fr-FR" dirty="0"/>
-              <a:t> to </a:t>
-            </a:r>
-            <a:r>
-              <a:rPr lang="fr-FR" dirty="0" err="1"/>
-              <a:t>handle</a:t>
-            </a:r>
-            <a:r>
-              <a:rPr lang="fr-FR" dirty="0"/>
-              <a:t> </a:t>
-            </a:r>
-            <a:r>
-              <a:rPr lang="fr-FR" dirty="0" err="1"/>
-              <a:t>it</a:t>
-            </a:r>
-            <a:r>
-              <a:rPr lang="fr-FR" dirty="0"/>
-              <a:t> BEFOREHAND </a:t>
-            </a:r>
-            <a:r>
-              <a:rPr lang="fr-FR" dirty="0" err="1"/>
-              <a:t>through</a:t>
-            </a:r>
-            <a:r>
-              <a:rPr lang="fr-FR" dirty="0"/>
-              <a:t> Python </a:t>
-            </a:r>
-            <a:r>
-              <a:rPr lang="fr-FR" dirty="0" err="1"/>
-              <a:t>after</a:t>
-            </a:r>
-            <a:r>
-              <a:rPr lang="fr-FR" dirty="0"/>
-              <a:t> 3 </a:t>
-            </a:r>
-            <a:r>
-              <a:rPr lang="fr-FR" dirty="0" err="1"/>
-              <a:t>hours</a:t>
-            </a:r>
-            <a:endParaRPr lang="fr-FR" dirty="0"/>
-          </a:p>
-          <a:p>
-            <a:r>
-              <a:rPr lang="fr-FR" dirty="0"/>
-              <a:t>P3 – </a:t>
-            </a:r>
-            <a:r>
-              <a:rPr lang="fr-FR" dirty="0" err="1"/>
-              <a:t>Working</a:t>
-            </a:r>
-            <a:r>
-              <a:rPr lang="fr-FR" dirty="0"/>
-              <a:t> on the </a:t>
+              <a:t> (python, SQL, </a:t>
             </a:r>
             <a:r>
               <a:rPr lang="fr-FR" dirty="0" err="1"/>
@@ -13663,85 +13626,8 @@
             </a:r>
             <a:r>
               <a:rPr lang="fr-FR" dirty="0"/>
-              <a:t> </a:t>
-            </a:r>
-            <a:r>
-              <a:rPr lang="fr-FR" dirty="0" err="1"/>
-              <a:t>with</a:t>
-            </a:r>
-            <a:r>
-              <a:rPr lang="fr-FR" dirty="0"/>
-              <a:t> a </a:t>
-            </a:r>
-            <a:r>
-              <a:rPr lang="fr-FR" dirty="0" err="1"/>
-              <a:t>working</a:t>
-            </a:r>
-            <a:r>
-              <a:rPr lang="fr-FR" dirty="0"/>
-              <a:t> Python code </a:t>
-            </a:r>
-            <a:r>
-              <a:rPr lang="fr-FR" dirty="0" err="1"/>
-              <a:t>while</a:t>
-            </a:r>
-            <a:r>
-              <a:rPr lang="fr-FR" dirty="0"/>
-              <a:t> </a:t>
-            </a:r>
-            <a:r>
-              <a:rPr lang="fr-FR" dirty="0" err="1"/>
-              <a:t>still</a:t>
-            </a:r>
-            <a:r>
-              <a:rPr lang="fr-FR" dirty="0"/>
-              <a:t> </a:t>
-            </a:r>
-            <a:r>
-              <a:rPr lang="fr-FR" dirty="0" err="1"/>
-              <a:t>trying</a:t>
-            </a:r>
-            <a:r>
-              <a:rPr lang="fr-FR" dirty="0"/>
-              <a:t> to </a:t>
-            </a:r>
-            <a:r>
-              <a:rPr lang="fr-FR" dirty="0" err="1"/>
-              <a:t>make</a:t>
-            </a:r>
-            <a:r>
-              <a:rPr lang="fr-FR" dirty="0"/>
-              <a:t> </a:t>
-            </a:r>
-            <a:r>
-              <a:rPr lang="fr-FR" dirty="0" err="1"/>
-              <a:t>it</a:t>
-            </a:r>
-            <a:r>
-              <a:rPr lang="fr-FR" dirty="0"/>
-              <a:t> </a:t>
-            </a:r>
-            <a:r>
-              <a:rPr lang="fr-FR" dirty="0" err="1"/>
-              <a:t>work</a:t>
-            </a:r>
-            <a:r>
-              <a:rPr lang="fr-FR" dirty="0"/>
-              <a:t> </a:t>
-            </a:r>
-            <a:r>
-              <a:rPr lang="fr-FR" dirty="0" err="1"/>
-              <a:t>through</a:t>
-            </a:r>
-            <a:r>
-              <a:rPr lang="fr-FR" dirty="0"/>
-              <a:t> </a:t>
-            </a:r>
-            <a:r>
-              <a:rPr lang="fr-FR" dirty="0" err="1"/>
-              <a:t>mySQL</a:t>
-            </a:r>
-            <a:endParaRPr lang="fr-FR" dirty="0"/>
+              <a:t>)</a:t>
+            </a:r>
           </a:p>
           <a:p>
             <a:endParaRPr lang="fr-FR" dirty="0"/>
@@ -13905,11 +13791,106 @@
             </a:r>
             <a:r>
               <a:rPr lang="fr-FR" sz="2000" dirty="0" err="1"/>
+              <a:t>too</a:t>
+            </a:r>
+            <a:r>
+              <a:rPr lang="fr-FR" sz="2000" dirty="0"/>
+              <a:t> </a:t>
+            </a:r>
+            <a:r>
+              <a:rPr lang="fr-FR" sz="2000" dirty="0" err="1"/>
               <a:t>painful</a:t>
             </a:r>
+            <a:endParaRPr lang="fr-FR" sz="2000" dirty="0"/>
+          </a:p>
+          <a:p>
+            <a:endParaRPr lang="fr-FR" sz="2000" dirty="0"/>
+          </a:p>
+          <a:p>
+            <a:r>
+              <a:rPr lang="fr-FR" sz="2000" dirty="0" err="1"/>
+              <a:t>Loved</a:t>
+            </a:r>
             <a:r>
               <a:rPr lang="fr-FR" sz="2000" dirty="0"/>
-              <a:t>. But </a:t>
+              <a:t> to </a:t>
+            </a:r>
+            <a:r>
+              <a:rPr lang="fr-FR" sz="2000" dirty="0" err="1"/>
+              <a:t>work</a:t>
+            </a:r>
+            <a:r>
+              <a:rPr lang="fr-FR" sz="2000" dirty="0"/>
+              <a:t> as a team, teasing </a:t>
+            </a:r>
+            <a:r>
+              <a:rPr lang="fr-FR" sz="2000" dirty="0" err="1"/>
+              <a:t>each</a:t>
+            </a:r>
+            <a:r>
+              <a:rPr lang="fr-FR" sz="2000" dirty="0"/>
+              <a:t> </a:t>
+            </a:r>
+            <a:r>
+              <a:rPr lang="fr-FR" sz="2000" dirty="0" err="1"/>
+              <a:t>other</a:t>
+            </a:r>
+            <a:r>
+              <a:rPr lang="fr-FR" sz="2000" dirty="0"/>
+              <a:t> all </a:t>
+            </a:r>
+            <a:r>
+              <a:rPr lang="fr-FR" sz="2000" dirty="0" err="1"/>
+              <a:t>day</a:t>
+            </a:r>
+            <a:r>
+              <a:rPr lang="fr-FR" sz="2000" dirty="0"/>
+              <a:t> long</a:t>
+            </a:r>
+          </a:p>
+          <a:p>
+            <a:endParaRPr lang="fr-FR" sz="2000" dirty="0"/>
+          </a:p>
+          <a:p>
+            <a:r>
+              <a:rPr lang="fr-FR" sz="2000" dirty="0" err="1"/>
+              <a:t>Felt</a:t>
+            </a:r>
+            <a:r>
+              <a:rPr lang="fr-FR" sz="2000" dirty="0"/>
+              <a:t> </a:t>
+            </a:r>
+            <a:r>
+              <a:rPr lang="fr-FR" sz="2000" dirty="0" err="1"/>
+              <a:t>it</a:t>
+            </a:r>
+            <a:r>
+              <a:rPr lang="fr-FR" sz="2000" dirty="0"/>
+              <a:t> </a:t>
+            </a:r>
+            <a:r>
+              <a:rPr lang="fr-FR" sz="2000" dirty="0" err="1"/>
+              <a:t>would</a:t>
+            </a:r>
+            <a:r>
+              <a:rPr lang="fr-FR" sz="2000" dirty="0"/>
+              <a:t> have been </a:t>
+            </a:r>
+            <a:r>
+              <a:rPr lang="fr-FR" sz="2000" dirty="0" err="1"/>
+              <a:t>much</a:t>
+            </a:r>
+            <a:r>
+              <a:rPr lang="fr-FR" sz="2000" dirty="0"/>
+              <a:t> more </a:t>
+            </a:r>
+            <a:r>
+              <a:rPr lang="fr-FR" sz="2000" dirty="0" err="1"/>
+              <a:t>engaging</a:t>
+            </a:r>
+            <a:r>
+              <a:rPr lang="fr-FR" sz="2000" dirty="0"/>
+              <a:t> if </a:t>
             </a:r>
             <a:r>
               <a:rPr lang="fr-FR" sz="2000" dirty="0" err="1"/>
@@ -13921,15 +13902,15 @@
             </a:r>
             <a:r>
               <a:rPr lang="fr-FR" sz="2000" dirty="0" err="1"/>
-              <a:t>wanted</a:t>
+              <a:t>had</a:t>
             </a:r>
             <a:r>
               <a:rPr lang="fr-FR" sz="2000" dirty="0"/>
-              <a:t> to go </a:t>
+              <a:t> to </a:t>
             </a:r>
             <a:r>
               <a:rPr lang="fr-FR" sz="2000" dirty="0" err="1"/>
-              <a:t>through</a:t>
+              <a:t>collect</a:t>
             </a:r>
             <a:r>
               <a:rPr lang="fr-FR" sz="2000" dirty="0"/>
@@ -13937,7 +13918,15 @@
             </a:r>
             <a:r>
               <a:rPr lang="fr-FR" sz="2000" dirty="0" err="1"/>
-              <a:t>with</a:t>
+              <a:t>some</a:t>
+            </a:r>
+            <a:r>
+              <a:rPr lang="fr-FR" sz="2000" dirty="0"/>
+              <a:t> data and exploit </a:t>
+            </a:r>
+            <a:r>
+              <a:rPr lang="fr-FR" sz="2000" dirty="0" err="1"/>
+              <a:t>it</a:t>
             </a:r>
             <a:r>
               <a:rPr lang="fr-FR" sz="2000" dirty="0"/>
@@ -13945,15 +13934,15 @@
             </a:r>
             <a:r>
               <a:rPr lang="fr-FR" sz="2000" dirty="0" err="1"/>
-              <a:t>it</a:t>
+              <a:t>with</a:t>
             </a:r>
             <a:r>
               <a:rPr lang="fr-FR" sz="2000" dirty="0"/>
-              <a:t> no </a:t>
+              <a:t> an </a:t>
             </a:r>
             <a:r>
               <a:rPr lang="fr-FR" sz="2000" dirty="0" err="1"/>
-              <a:t>matter</a:t>
+              <a:t>actual</a:t>
             </a:r>
             <a:r>
               <a:rPr lang="fr-FR" sz="2000" dirty="0"/>
@@ -13961,15 +13950,33 @@
             </a:r>
             <a:r>
               <a:rPr lang="fr-FR" sz="2000" dirty="0" err="1"/>
-              <a:t>what</a:t>
+              <a:t>meaningful</a:t>
             </a:r>
             <a:r>
               <a:rPr lang="fr-FR" sz="2000" dirty="0"/>
-              <a:t> for </a:t>
+              <a:t> composite </a:t>
             </a:r>
             <a:r>
               <a:rPr lang="fr-FR" sz="2000" dirty="0" err="1"/>
-              <a:t>glory</a:t>
+              <a:t>indicator</a:t>
+            </a:r>
+            <a:endParaRPr lang="fr-FR" sz="2000" dirty="0"/>
+          </a:p>
+          <a:p>
+            <a:endParaRPr lang="fr-FR" sz="2000" dirty="0"/>
+          </a:p>
+          <a:p>
+            <a:r>
+              <a:rPr lang="fr-FR" sz="2000" dirty="0" err="1"/>
+              <a:t>Pleasure</a:t>
+            </a:r>
+            <a:r>
+              <a:rPr lang="fr-FR" sz="2000" dirty="0"/>
+              <a:t> to face </a:t>
+            </a:r>
+            <a:r>
+              <a:rPr lang="fr-FR" sz="2000" dirty="0" err="1"/>
+              <a:t>difficulty</a:t>
             </a:r>
             <a:r>
               <a:rPr lang="fr-FR" sz="2000" dirty="0"/>
@@ -13977,346 +13984,17 @@
             </a:r>
             <a:r>
               <a:rPr lang="fr-FR" sz="2000" dirty="0" err="1"/>
-              <a:t>obviously</a:t>
+              <a:t>together</a:t>
             </a:r>
             <a:r>
               <a:rPr lang="fr-FR" sz="2000" dirty="0"/>
-              <a:t> #insert </a:t>
-            </a:r>
-            <a:r>
-              <a:rPr lang="fr-FR" sz="2000" dirty="0" err="1"/>
-              <a:t>fireemoji</a:t>
-            </a:r>
-            <a:endParaRPr lang="fr-FR" sz="2000" dirty="0"/>
-          </a:p>
-          <a:p>
-            <a:r>
-              <a:rPr lang="fr-FR" sz="2000" dirty="0" err="1"/>
-              <a:t>Loved</a:t>
-            </a:r>
-            <a:r>
-              <a:rPr lang="fr-FR" sz="2000" dirty="0"/>
-              <a:t> to </a:t>
-            </a:r>
-            <a:r>
-              <a:rPr lang="fr-FR" sz="2000" dirty="0" err="1"/>
-              <a:t>work</a:t>
-            </a:r>
-            <a:r>
-              <a:rPr lang="fr-FR" sz="2000" dirty="0"/>
-              <a:t> as a team, teasing </a:t>
-            </a:r>
-            <a:r>
-              <a:rPr lang="fr-FR" sz="2000" dirty="0" err="1"/>
-              <a:t>each</a:t>
-            </a:r>
-            <a:r>
-              <a:rPr lang="fr-FR" sz="2000" dirty="0"/>
-              <a:t> </a:t>
-            </a:r>
-            <a:r>
-              <a:rPr lang="fr-FR" sz="2000" dirty="0" err="1"/>
-              <a:t>other</a:t>
-            </a:r>
-            <a:r>
-              <a:rPr lang="fr-FR" sz="2000" dirty="0"/>
-              <a:t> all </a:t>
-            </a:r>
-            <a:r>
-              <a:rPr lang="fr-FR" sz="2000" dirty="0" err="1"/>
-              <a:t>day</a:t>
-            </a:r>
-            <a:r>
-              <a:rPr lang="fr-FR" sz="2000" dirty="0"/>
-              <a:t> long on ours </a:t>
-            </a:r>
-            <a:r>
-              <a:rPr lang="fr-FR" sz="2000" dirty="0" err="1"/>
-              <a:t>own</a:t>
-            </a:r>
-            <a:r>
-              <a:rPr lang="fr-FR" sz="2000" dirty="0"/>
-              <a:t> </a:t>
-            </a:r>
-            <a:r>
-              <a:rPr lang="fr-FR" sz="2000" dirty="0" err="1"/>
-              <a:t>technical</a:t>
-            </a:r>
-            <a:r>
-              <a:rPr lang="fr-FR" sz="2000" dirty="0"/>
-              <a:t> or </a:t>
-            </a:r>
-            <a:r>
-              <a:rPr lang="fr-FR" sz="2000" dirty="0" err="1"/>
-              <a:t>psychological</a:t>
-            </a:r>
-            <a:r>
-              <a:rPr lang="fr-FR" sz="2000" dirty="0"/>
-              <a:t> limitations.</a:t>
-            </a:r>
-          </a:p>
-          <a:p>
-            <a:r>
-              <a:rPr lang="fr-FR" sz="2000" dirty="0" err="1"/>
-              <a:t>It’s</a:t>
-            </a:r>
-            <a:r>
-              <a:rPr lang="fr-FR" sz="2000" dirty="0"/>
-              <a:t> </a:t>
-            </a:r>
-            <a:r>
-              <a:rPr lang="fr-FR" sz="2000" dirty="0" err="1"/>
-              <a:t>still</a:t>
-            </a:r>
-            <a:r>
-              <a:rPr lang="fr-FR" sz="2000" dirty="0"/>
-              <a:t> a </a:t>
-            </a:r>
-            <a:r>
-              <a:rPr lang="fr-FR" sz="2000" dirty="0" err="1"/>
-              <a:t>pleasure</a:t>
-            </a:r>
-            <a:r>
-              <a:rPr lang="fr-FR" sz="2000" dirty="0"/>
-              <a:t> to face </a:t>
-            </a:r>
-            <a:r>
-              <a:rPr lang="fr-FR" sz="2000" dirty="0" err="1"/>
-              <a:t>diffculty</a:t>
-            </a:r>
-            <a:r>
-              <a:rPr lang="fr-FR" sz="2000" dirty="0"/>
-              <a:t>, </a:t>
+              <a:t>; and come out on top, </a:t>
             </a:r>
             <a:r>
               <a:rPr lang="fr-FR" sz="2000" dirty="0" err="1"/>
               <a:t>together</a:t>
             </a:r>
-            <a:r>
-              <a:rPr lang="fr-FR" sz="2000" dirty="0"/>
-              <a:t>; and come out on top, </a:t>
-            </a:r>
-            <a:r>
-              <a:rPr lang="fr-FR" sz="2000" dirty="0" err="1"/>
-              <a:t>together</a:t>
-            </a:r>
-            <a:r>
-              <a:rPr lang="fr-FR" sz="2000" dirty="0"/>
-              <a:t>.</a:t>
-            </a:r>
-          </a:p>
-          <a:p>
             <a:endParaRPr lang="fr-FR" sz="2000" dirty="0"/>
-          </a:p>
-          <a:p>
-            <a:r>
-              <a:rPr lang="fr-FR" sz="2000" dirty="0" err="1"/>
-              <a:t>We</a:t>
-            </a:r>
-            <a:r>
-              <a:rPr lang="fr-FR" sz="2000" dirty="0"/>
-              <a:t> </a:t>
-            </a:r>
-            <a:r>
-              <a:rPr lang="fr-FR" sz="2000" dirty="0" err="1"/>
-              <a:t>would</a:t>
-            </a:r>
-            <a:r>
-              <a:rPr lang="fr-FR" sz="2000" dirty="0"/>
-              <a:t> like to </a:t>
-            </a:r>
-            <a:r>
-              <a:rPr lang="fr-FR" sz="2000" dirty="0" err="1"/>
-              <a:t>adress</a:t>
-            </a:r>
-            <a:r>
-              <a:rPr lang="fr-FR" sz="2000" dirty="0"/>
-              <a:t> the big issue </a:t>
-            </a:r>
-            <a:r>
-              <a:rPr lang="fr-FR" sz="2000" dirty="0" err="1"/>
-              <a:t>that</a:t>
-            </a:r>
-            <a:r>
-              <a:rPr lang="fr-FR" sz="2000" dirty="0"/>
-              <a:t> </a:t>
-            </a:r>
-            <a:r>
-              <a:rPr lang="fr-FR" sz="2000" dirty="0" err="1"/>
-              <a:t>we</a:t>
-            </a:r>
-            <a:r>
-              <a:rPr lang="fr-FR" sz="2000" dirty="0"/>
-              <a:t> </a:t>
-            </a:r>
-            <a:r>
-              <a:rPr lang="fr-FR" sz="2000" dirty="0" err="1"/>
-              <a:t>had</a:t>
-            </a:r>
-            <a:r>
-              <a:rPr lang="fr-FR" sz="2000" dirty="0"/>
-              <a:t> </a:t>
-            </a:r>
-            <a:r>
-              <a:rPr lang="fr-FR" sz="2000" dirty="0" err="1"/>
-              <a:t>with</a:t>
-            </a:r>
-            <a:r>
-              <a:rPr lang="fr-FR" sz="2000" dirty="0"/>
-              <a:t> </a:t>
-            </a:r>
-            <a:r>
-              <a:rPr lang="fr-FR" sz="2000" dirty="0" err="1"/>
-              <a:t>this</a:t>
-            </a:r>
-            <a:r>
-              <a:rPr lang="fr-FR" sz="2000" dirty="0"/>
-              <a:t> </a:t>
-            </a:r>
-            <a:r>
-              <a:rPr lang="fr-FR" sz="2000" dirty="0" err="1"/>
-              <a:t>project</a:t>
-            </a:r>
-            <a:r>
-              <a:rPr lang="fr-FR" sz="2000" dirty="0"/>
-              <a:t> </a:t>
-            </a:r>
-            <a:r>
-              <a:rPr lang="fr-FR" sz="2000" dirty="0" err="1"/>
-              <a:t>compared</a:t>
-            </a:r>
-            <a:r>
-              <a:rPr lang="fr-FR" sz="2000" dirty="0"/>
-              <a:t> to the first one : </a:t>
-            </a:r>
-            <a:r>
-              <a:rPr lang="fr-FR" sz="2000" dirty="0" err="1"/>
-              <a:t>We</a:t>
-            </a:r>
-            <a:r>
-              <a:rPr lang="fr-FR" sz="2000" dirty="0"/>
-              <a:t> </a:t>
-            </a:r>
-            <a:r>
-              <a:rPr lang="fr-FR" sz="2000" dirty="0" err="1"/>
-              <a:t>feel</a:t>
-            </a:r>
-            <a:r>
-              <a:rPr lang="fr-FR" sz="2000" dirty="0"/>
-              <a:t> </a:t>
-            </a:r>
-            <a:r>
-              <a:rPr lang="fr-FR" sz="2000" dirty="0" err="1"/>
-              <a:t>it</a:t>
-            </a:r>
-            <a:r>
-              <a:rPr lang="fr-FR" sz="2000" dirty="0"/>
-              <a:t> </a:t>
-            </a:r>
-            <a:r>
-              <a:rPr lang="fr-FR" sz="2000" dirty="0" err="1"/>
-              <a:t>would</a:t>
-            </a:r>
-            <a:r>
-              <a:rPr lang="fr-FR" sz="2000" dirty="0"/>
-              <a:t> </a:t>
-            </a:r>
-            <a:r>
-              <a:rPr lang="fr-FR" sz="2000" dirty="0" err="1"/>
-              <a:t>be</a:t>
-            </a:r>
-            <a:r>
-              <a:rPr lang="fr-FR" sz="2000" dirty="0"/>
-              <a:t> </a:t>
-            </a:r>
-            <a:r>
-              <a:rPr lang="fr-FR" sz="2000" dirty="0" err="1"/>
-              <a:t>much</a:t>
-            </a:r>
-            <a:r>
-              <a:rPr lang="fr-FR" sz="2000" dirty="0"/>
-              <a:t> more </a:t>
-            </a:r>
-            <a:r>
-              <a:rPr lang="fr-FR" sz="2000" dirty="0" err="1"/>
-              <a:t>engaging</a:t>
-            </a:r>
-            <a:r>
-              <a:rPr lang="fr-FR" sz="2000" dirty="0"/>
-              <a:t> if </a:t>
-            </a:r>
-            <a:r>
-              <a:rPr lang="fr-FR" sz="2000" dirty="0" err="1"/>
-              <a:t>we</a:t>
-            </a:r>
-            <a:r>
-              <a:rPr lang="fr-FR" sz="2000" dirty="0"/>
-              <a:t> </a:t>
-            </a:r>
-            <a:r>
-              <a:rPr lang="fr-FR" sz="2000" dirty="0" err="1"/>
-              <a:t>had</a:t>
-            </a:r>
-            <a:r>
-              <a:rPr lang="fr-FR" sz="2000" dirty="0"/>
-              <a:t> to </a:t>
-            </a:r>
-            <a:r>
-              <a:rPr lang="fr-FR" sz="2000" dirty="0" err="1"/>
-              <a:t>collect</a:t>
-            </a:r>
-            <a:r>
-              <a:rPr lang="fr-FR" sz="2000" dirty="0"/>
-              <a:t> </a:t>
-            </a:r>
-            <a:r>
-              <a:rPr lang="fr-FR" sz="2000" dirty="0" err="1"/>
-              <a:t>some</a:t>
-            </a:r>
-            <a:r>
-              <a:rPr lang="fr-FR" sz="2000" dirty="0"/>
-              <a:t> data and exploit </a:t>
-            </a:r>
-            <a:r>
-              <a:rPr lang="fr-FR" sz="2000" dirty="0" err="1"/>
-              <a:t>it</a:t>
-            </a:r>
-            <a:r>
-              <a:rPr lang="fr-FR" sz="2000" dirty="0"/>
-              <a:t> </a:t>
-            </a:r>
-            <a:r>
-              <a:rPr lang="fr-FR" sz="2000" dirty="0" err="1"/>
-              <a:t>with</a:t>
-            </a:r>
-            <a:r>
-              <a:rPr lang="fr-FR" sz="2000" dirty="0"/>
-              <a:t> an </a:t>
-            </a:r>
-            <a:r>
-              <a:rPr lang="fr-FR" sz="2000" dirty="0" err="1"/>
-              <a:t>actual</a:t>
-            </a:r>
-            <a:r>
-              <a:rPr lang="fr-FR" sz="2000" dirty="0"/>
-              <a:t> </a:t>
-            </a:r>
-            <a:r>
-              <a:rPr lang="fr-FR" sz="2000" dirty="0" err="1"/>
-              <a:t>meaningful</a:t>
-            </a:r>
-            <a:r>
-              <a:rPr lang="fr-FR" sz="2000" dirty="0"/>
-              <a:t> </a:t>
-            </a:r>
-            <a:r>
-              <a:rPr lang="fr-FR" sz="2000" dirty="0" err="1"/>
-              <a:t>indicator</a:t>
-            </a:r>
-            <a:r>
-              <a:rPr lang="fr-FR" sz="2000" dirty="0"/>
-              <a:t>.</a:t>
-            </a:r>
           </a:p>
         </p:txBody>
       </p:sp>

</xml_diff>